<commit_message>
Add the rest of doc for dev guide without appendices
</commit_message>
<xml_diff>
--- a/doc/UML.pptx
+++ b/doc/UML.pptx
@@ -6,7 +6,11 @@
   </p:sldMasterIdLst>
   <p:sldIdLst>
     <p:sldId id="257" r:id="rId2"/>
-    <p:sldId id="256" r:id="rId3"/>
+    <p:sldId id="259" r:id="rId3"/>
+    <p:sldId id="260" r:id="rId4"/>
+    <p:sldId id="261" r:id="rId5"/>
+    <p:sldId id="258" r:id="rId6"/>
+    <p:sldId id="256" r:id="rId7"/>
   </p:sldIdLst>
   <p:sldSz cx="12192000" cy="6858000"/>
   <p:notesSz cx="6858000" cy="9144000"/>
@@ -244,7 +248,7 @@
           <a:p>
             <a:fld id="{6A6D87FE-50F0-4561-88DF-C9C624F56716}" type="datetimeFigureOut">
               <a:rPr lang="en-SG" smtClean="0"/>
-              <a:t>8/10/2016</a:t>
+              <a:t>12/10/2016</a:t>
             </a:fld>
             <a:endParaRPr lang="en-SG"/>
           </a:p>
@@ -414,7 +418,7 @@
           <a:p>
             <a:fld id="{6A6D87FE-50F0-4561-88DF-C9C624F56716}" type="datetimeFigureOut">
               <a:rPr lang="en-SG" smtClean="0"/>
-              <a:t>8/10/2016</a:t>
+              <a:t>12/10/2016</a:t>
             </a:fld>
             <a:endParaRPr lang="en-SG"/>
           </a:p>
@@ -594,7 +598,7 @@
           <a:p>
             <a:fld id="{6A6D87FE-50F0-4561-88DF-C9C624F56716}" type="datetimeFigureOut">
               <a:rPr lang="en-SG" smtClean="0"/>
-              <a:t>8/10/2016</a:t>
+              <a:t>12/10/2016</a:t>
             </a:fld>
             <a:endParaRPr lang="en-SG"/>
           </a:p>
@@ -764,7 +768,7 @@
           <a:p>
             <a:fld id="{6A6D87FE-50F0-4561-88DF-C9C624F56716}" type="datetimeFigureOut">
               <a:rPr lang="en-SG" smtClean="0"/>
-              <a:t>8/10/2016</a:t>
+              <a:t>12/10/2016</a:t>
             </a:fld>
             <a:endParaRPr lang="en-SG"/>
           </a:p>
@@ -1010,7 +1014,7 @@
           <a:p>
             <a:fld id="{6A6D87FE-50F0-4561-88DF-C9C624F56716}" type="datetimeFigureOut">
               <a:rPr lang="en-SG" smtClean="0"/>
-              <a:t>8/10/2016</a:t>
+              <a:t>12/10/2016</a:t>
             </a:fld>
             <a:endParaRPr lang="en-SG"/>
           </a:p>
@@ -1242,7 +1246,7 @@
           <a:p>
             <a:fld id="{6A6D87FE-50F0-4561-88DF-C9C624F56716}" type="datetimeFigureOut">
               <a:rPr lang="en-SG" smtClean="0"/>
-              <a:t>8/10/2016</a:t>
+              <a:t>12/10/2016</a:t>
             </a:fld>
             <a:endParaRPr lang="en-SG"/>
           </a:p>
@@ -1609,7 +1613,7 @@
           <a:p>
             <a:fld id="{6A6D87FE-50F0-4561-88DF-C9C624F56716}" type="datetimeFigureOut">
               <a:rPr lang="en-SG" smtClean="0"/>
-              <a:t>8/10/2016</a:t>
+              <a:t>12/10/2016</a:t>
             </a:fld>
             <a:endParaRPr lang="en-SG"/>
           </a:p>
@@ -1727,7 +1731,7 @@
           <a:p>
             <a:fld id="{6A6D87FE-50F0-4561-88DF-C9C624F56716}" type="datetimeFigureOut">
               <a:rPr lang="en-SG" smtClean="0"/>
-              <a:t>8/10/2016</a:t>
+              <a:t>12/10/2016</a:t>
             </a:fld>
             <a:endParaRPr lang="en-SG"/>
           </a:p>
@@ -1822,7 +1826,7 @@
           <a:p>
             <a:fld id="{6A6D87FE-50F0-4561-88DF-C9C624F56716}" type="datetimeFigureOut">
               <a:rPr lang="en-SG" smtClean="0"/>
-              <a:t>8/10/2016</a:t>
+              <a:t>12/10/2016</a:t>
             </a:fld>
             <a:endParaRPr lang="en-SG"/>
           </a:p>
@@ -2099,7 +2103,7 @@
           <a:p>
             <a:fld id="{6A6D87FE-50F0-4561-88DF-C9C624F56716}" type="datetimeFigureOut">
               <a:rPr lang="en-SG" smtClean="0"/>
-              <a:t>8/10/2016</a:t>
+              <a:t>12/10/2016</a:t>
             </a:fld>
             <a:endParaRPr lang="en-SG"/>
           </a:p>
@@ -2352,7 +2356,7 @@
           <a:p>
             <a:fld id="{6A6D87FE-50F0-4561-88DF-C9C624F56716}" type="datetimeFigureOut">
               <a:rPr lang="en-SG" smtClean="0"/>
-              <a:t>8/10/2016</a:t>
+              <a:t>12/10/2016</a:t>
             </a:fld>
             <a:endParaRPr lang="en-SG"/>
           </a:p>
@@ -2565,7 +2569,7 @@
           <a:p>
             <a:fld id="{6A6D87FE-50F0-4561-88DF-C9C624F56716}" type="datetimeFigureOut">
               <a:rPr lang="en-SG" smtClean="0"/>
-              <a:t>8/10/2016</a:t>
+              <a:t>12/10/2016</a:t>
             </a:fld>
             <a:endParaRPr lang="en-SG"/>
           </a:p>
@@ -2954,6 +2958,4740 @@
 </file>
 
 <file path=ppt/slides/slide1.xml><?xml version="1.0" encoding="utf-8"?>
+<p:sld xmlns:a="http://schemas.openxmlformats.org/drawingml/2006/main" xmlns:r="http://schemas.openxmlformats.org/officeDocument/2006/relationships" xmlns:p="http://schemas.openxmlformats.org/presentationml/2006/main">
+  <p:cSld>
+    <p:spTree>
+      <p:nvGrpSpPr>
+        <p:cNvPr id="1" name=""/>
+        <p:cNvGrpSpPr/>
+        <p:nvPr/>
+      </p:nvGrpSpPr>
+      <p:grpSpPr>
+        <a:xfrm>
+          <a:off x="0" y="0"/>
+          <a:ext cx="0" cy="0"/>
+          <a:chOff x="0" y="0"/>
+          <a:chExt cx="0" cy="0"/>
+        </a:xfrm>
+      </p:grpSpPr>
+      <p:sp>
+        <p:nvSpPr>
+          <p:cNvPr id="4" name="TextBox 3"/>
+          <p:cNvSpPr txBox="1"/>
+          <p:nvPr/>
+        </p:nvSpPr>
+        <p:spPr>
+          <a:xfrm>
+            <a:off x="0" y="0"/>
+            <a:ext cx="2136675" cy="369332"/>
+          </a:xfrm>
+          <a:prstGeom prst="rect">
+            <a:avLst/>
+          </a:prstGeom>
+          <a:noFill/>
+        </p:spPr>
+        <p:txBody>
+          <a:bodyPr wrap="none" rtlCol="0">
+            <a:spAutoFit/>
+          </a:bodyPr>
+          <a:lstStyle/>
+          <a:p>
+            <a:r>
+              <a:rPr lang="en-SG" dirty="0">
+                <a:latin typeface="Garamond" panose="02020404030301010803" pitchFamily="18" charset="0"/>
+              </a:rPr>
+              <a:t>Architecture Diagram</a:t>
+            </a:r>
+          </a:p>
+        </p:txBody>
+      </p:sp>
+      <p:grpSp>
+        <p:nvGrpSpPr>
+          <p:cNvPr id="43" name="Group 42"/>
+          <p:cNvGrpSpPr/>
+          <p:nvPr/>
+        </p:nvGrpSpPr>
+        <p:grpSpPr>
+          <a:xfrm>
+            <a:off x="2537003" y="2414973"/>
+            <a:ext cx="5645209" cy="2500219"/>
+            <a:chOff x="2339295" y="2489113"/>
+            <a:chExt cx="5645209" cy="2500219"/>
+          </a:xfrm>
+        </p:grpSpPr>
+        <p:sp>
+          <p:nvSpPr>
+            <p:cNvPr id="5" name="Rectangle 4"/>
+            <p:cNvSpPr/>
+            <p:nvPr/>
+          </p:nvSpPr>
+          <p:spPr>
+            <a:xfrm>
+              <a:off x="3481902" y="2489113"/>
+              <a:ext cx="4502602" cy="2500219"/>
+            </a:xfrm>
+            <a:prstGeom prst="rect">
+              <a:avLst/>
+            </a:prstGeom>
+            <a:solidFill>
+              <a:schemeClr val="bg1">
+                <a:lumMod val="95000"/>
+                <a:alpha val="43000"/>
+              </a:schemeClr>
+            </a:solidFill>
+            <a:ln w="19050">
+              <a:solidFill>
+                <a:schemeClr val="bg2">
+                  <a:lumMod val="50000"/>
+                </a:schemeClr>
+              </a:solidFill>
+            </a:ln>
+          </p:spPr>
+          <p:style>
+            <a:lnRef idx="2">
+              <a:schemeClr val="accent1">
+                <a:shade val="50000"/>
+              </a:schemeClr>
+            </a:lnRef>
+            <a:fillRef idx="1">
+              <a:schemeClr val="accent1"/>
+            </a:fillRef>
+            <a:effectRef idx="0">
+              <a:schemeClr val="accent1"/>
+            </a:effectRef>
+            <a:fontRef idx="minor">
+              <a:schemeClr val="lt1"/>
+            </a:fontRef>
+          </p:style>
+          <p:txBody>
+            <a:bodyPr rtlCol="0" anchor="ctr"/>
+            <a:lstStyle/>
+            <a:p>
+              <a:pPr algn="ctr"/>
+              <a:r>
+                <a:rPr lang="en-SG" dirty="0"/>
+                <a:t> </a:t>
+              </a:r>
+            </a:p>
+          </p:txBody>
+        </p:sp>
+        <p:grpSp>
+          <p:nvGrpSpPr>
+            <p:cNvPr id="6" name="Group 5"/>
+            <p:cNvGrpSpPr/>
+            <p:nvPr/>
+          </p:nvGrpSpPr>
+          <p:grpSpPr>
+            <a:xfrm>
+              <a:off x="2339295" y="3366501"/>
+              <a:ext cx="508000" cy="808389"/>
+              <a:chOff x="2622102" y="2866883"/>
+              <a:chExt cx="508000" cy="808389"/>
+            </a:xfrm>
+          </p:grpSpPr>
+          <p:sp>
+            <p:nvSpPr>
+              <p:cNvPr id="11" name="Smiley Face 10"/>
+              <p:cNvSpPr/>
+              <p:nvPr/>
+            </p:nvSpPr>
+            <p:spPr>
+              <a:xfrm>
+                <a:off x="2622102" y="2866883"/>
+                <a:ext cx="508000" cy="480291"/>
+              </a:xfrm>
+              <a:prstGeom prst="smileyFace">
+                <a:avLst/>
+              </a:prstGeom>
+              <a:solidFill>
+                <a:schemeClr val="accent2">
+                  <a:lumMod val="20000"/>
+                  <a:lumOff val="80000"/>
+                </a:schemeClr>
+              </a:solidFill>
+              <a:ln>
+                <a:solidFill>
+                  <a:schemeClr val="bg2">
+                    <a:lumMod val="50000"/>
+                  </a:schemeClr>
+                </a:solidFill>
+              </a:ln>
+            </p:spPr>
+            <p:style>
+              <a:lnRef idx="1">
+                <a:schemeClr val="accent3"/>
+              </a:lnRef>
+              <a:fillRef idx="2">
+                <a:schemeClr val="accent3"/>
+              </a:fillRef>
+              <a:effectRef idx="1">
+                <a:schemeClr val="accent3"/>
+              </a:effectRef>
+              <a:fontRef idx="minor">
+                <a:schemeClr val="dk1"/>
+              </a:fontRef>
+            </p:style>
+            <p:txBody>
+              <a:bodyPr rtlCol="0" anchor="ctr"/>
+              <a:lstStyle/>
+              <a:p>
+                <a:pPr algn="ctr"/>
+                <a:endParaRPr lang="en-SG" dirty="0"/>
+              </a:p>
+            </p:txBody>
+          </p:sp>
+          <p:sp>
+            <p:nvSpPr>
+              <p:cNvPr id="22" name="TextBox 21"/>
+              <p:cNvSpPr txBox="1"/>
+              <p:nvPr/>
+            </p:nvSpPr>
+            <p:spPr>
+              <a:xfrm>
+                <a:off x="2629880" y="3305940"/>
+                <a:ext cx="492443" cy="369332"/>
+              </a:xfrm>
+              <a:prstGeom prst="rect">
+                <a:avLst/>
+              </a:prstGeom>
+              <a:noFill/>
+            </p:spPr>
+            <p:txBody>
+              <a:bodyPr wrap="none" rtlCol="0">
+                <a:spAutoFit/>
+              </a:bodyPr>
+              <a:lstStyle/>
+              <a:p>
+                <a:r>
+                  <a:rPr lang="en-SG" dirty="0">
+                    <a:solidFill>
+                      <a:schemeClr val="bg2">
+                        <a:lumMod val="50000"/>
+                      </a:schemeClr>
+                    </a:solidFill>
+                    <a:latin typeface="Garamond" panose="02020404030301010803" pitchFamily="18" charset="0"/>
+                  </a:rPr>
+                  <a:t>Jim</a:t>
+                </a:r>
+              </a:p>
+            </p:txBody>
+          </p:sp>
+        </p:grpSp>
+        <p:sp>
+          <p:nvSpPr>
+            <p:cNvPr id="3" name="Rectangle: Rounded Corners 2"/>
+            <p:cNvSpPr/>
+            <p:nvPr/>
+          </p:nvSpPr>
+          <p:spPr>
+            <a:xfrm>
+              <a:off x="6328917" y="3413863"/>
+              <a:ext cx="1451727" cy="785293"/>
+            </a:xfrm>
+            <a:prstGeom prst="roundRect">
+              <a:avLst/>
+            </a:prstGeom>
+            <a:ln w="19050"/>
+          </p:spPr>
+          <p:style>
+            <a:lnRef idx="2">
+              <a:schemeClr val="accent6"/>
+            </a:lnRef>
+            <a:fillRef idx="1">
+              <a:schemeClr val="lt1"/>
+            </a:fillRef>
+            <a:effectRef idx="0">
+              <a:schemeClr val="accent6"/>
+            </a:effectRef>
+            <a:fontRef idx="minor">
+              <a:schemeClr val="dk1"/>
+            </a:fontRef>
+          </p:style>
+          <p:txBody>
+            <a:bodyPr rtlCol="0" anchor="ctr"/>
+            <a:lstStyle/>
+            <a:p>
+              <a:pPr algn="ctr"/>
+              <a:r>
+                <a:rPr lang="en-SG" dirty="0">
+                  <a:solidFill>
+                    <a:schemeClr val="accent6"/>
+                  </a:solidFill>
+                </a:rPr>
+                <a:t>Model</a:t>
+              </a:r>
+            </a:p>
+          </p:txBody>
+        </p:sp>
+        <p:sp>
+          <p:nvSpPr>
+            <p:cNvPr id="25" name="Rectangle: Rounded Corners 24"/>
+            <p:cNvSpPr/>
+            <p:nvPr/>
+          </p:nvSpPr>
+          <p:spPr>
+            <a:xfrm>
+              <a:off x="3833700" y="2733272"/>
+              <a:ext cx="1451727" cy="785293"/>
+            </a:xfrm>
+            <a:prstGeom prst="roundRect">
+              <a:avLst/>
+            </a:prstGeom>
+            <a:solidFill>
+              <a:schemeClr val="bg1"/>
+            </a:solidFill>
+            <a:ln w="19050">
+              <a:solidFill>
+                <a:schemeClr val="accent2"/>
+              </a:solidFill>
+            </a:ln>
+          </p:spPr>
+          <p:style>
+            <a:lnRef idx="2">
+              <a:schemeClr val="accent2"/>
+            </a:lnRef>
+            <a:fillRef idx="1">
+              <a:schemeClr val="lt1"/>
+            </a:fillRef>
+            <a:effectRef idx="0">
+              <a:schemeClr val="accent2"/>
+            </a:effectRef>
+            <a:fontRef idx="minor">
+              <a:schemeClr val="dk1"/>
+            </a:fontRef>
+          </p:style>
+          <p:txBody>
+            <a:bodyPr rtlCol="0" anchor="ctr"/>
+            <a:lstStyle/>
+            <a:p>
+              <a:pPr algn="ctr"/>
+              <a:r>
+                <a:rPr lang="en-SG" dirty="0">
+                  <a:solidFill>
+                    <a:schemeClr val="accent2"/>
+                  </a:solidFill>
+                </a:rPr>
+                <a:t>View</a:t>
+              </a:r>
+            </a:p>
+          </p:txBody>
+        </p:sp>
+        <p:sp>
+          <p:nvSpPr>
+            <p:cNvPr id="32" name="Rectangle: Rounded Corners 31"/>
+            <p:cNvSpPr/>
+            <p:nvPr/>
+          </p:nvSpPr>
+          <p:spPr>
+            <a:xfrm>
+              <a:off x="3879390" y="4020519"/>
+              <a:ext cx="1451727" cy="785293"/>
+            </a:xfrm>
+            <a:prstGeom prst="roundRect">
+              <a:avLst/>
+            </a:prstGeom>
+            <a:ln w="19050"/>
+          </p:spPr>
+          <p:style>
+            <a:lnRef idx="2">
+              <a:schemeClr val="accent1"/>
+            </a:lnRef>
+            <a:fillRef idx="1">
+              <a:schemeClr val="lt1"/>
+            </a:fillRef>
+            <a:effectRef idx="0">
+              <a:schemeClr val="accent1"/>
+            </a:effectRef>
+            <a:fontRef idx="minor">
+              <a:schemeClr val="dk1"/>
+            </a:fontRef>
+          </p:style>
+          <p:txBody>
+            <a:bodyPr rtlCol="0" anchor="ctr"/>
+            <a:lstStyle/>
+            <a:p>
+              <a:pPr algn="ctr"/>
+              <a:r>
+                <a:rPr lang="en-SG" dirty="0">
+                  <a:solidFill>
+                    <a:schemeClr val="accent1"/>
+                  </a:solidFill>
+                </a:rPr>
+                <a:t>Controller</a:t>
+              </a:r>
+            </a:p>
+          </p:txBody>
+        </p:sp>
+        <p:cxnSp>
+          <p:nvCxnSpPr>
+            <p:cNvPr id="35" name="Straight Arrow Connector 34"/>
+            <p:cNvCxnSpPr/>
+            <p:nvPr/>
+          </p:nvCxnSpPr>
+          <p:spPr>
+            <a:xfrm flipV="1">
+              <a:off x="3007551" y="3111525"/>
+              <a:ext cx="760644" cy="302338"/>
+            </a:xfrm>
+            <a:prstGeom prst="straightConnector1">
+              <a:avLst/>
+            </a:prstGeom>
+            <a:ln w="38100">
+              <a:solidFill>
+                <a:schemeClr val="accent2">
+                  <a:lumMod val="60000"/>
+                  <a:lumOff val="40000"/>
+                </a:schemeClr>
+              </a:solidFill>
+              <a:headEnd type="arrow" w="med" len="med"/>
+              <a:tailEnd type="none" w="med" len="med"/>
+            </a:ln>
+          </p:spPr>
+          <p:style>
+            <a:lnRef idx="1">
+              <a:schemeClr val="accent1"/>
+            </a:lnRef>
+            <a:fillRef idx="0">
+              <a:schemeClr val="accent1"/>
+            </a:fillRef>
+            <a:effectRef idx="0">
+              <a:schemeClr val="accent1"/>
+            </a:effectRef>
+            <a:fontRef idx="minor">
+              <a:schemeClr val="tx1"/>
+            </a:fontRef>
+          </p:style>
+        </p:cxnSp>
+        <p:cxnSp>
+          <p:nvCxnSpPr>
+            <p:cNvPr id="36" name="Straight Arrow Connector 35"/>
+            <p:cNvCxnSpPr/>
+            <p:nvPr/>
+          </p:nvCxnSpPr>
+          <p:spPr>
+            <a:xfrm flipH="1" flipV="1">
+              <a:off x="3030331" y="3995713"/>
+              <a:ext cx="772703" cy="411769"/>
+            </a:xfrm>
+            <a:prstGeom prst="straightConnector1">
+              <a:avLst/>
+            </a:prstGeom>
+            <a:ln w="38100">
+              <a:solidFill>
+                <a:schemeClr val="accent2">
+                  <a:lumMod val="60000"/>
+                  <a:lumOff val="40000"/>
+                </a:schemeClr>
+              </a:solidFill>
+              <a:headEnd type="arrow" w="med" len="med"/>
+              <a:tailEnd type="none" w="med" len="med"/>
+            </a:ln>
+          </p:spPr>
+          <p:style>
+            <a:lnRef idx="1">
+              <a:schemeClr val="accent1"/>
+            </a:lnRef>
+            <a:fillRef idx="0">
+              <a:schemeClr val="accent1"/>
+            </a:fillRef>
+            <a:effectRef idx="0">
+              <a:schemeClr val="accent1"/>
+            </a:effectRef>
+            <a:fontRef idx="minor">
+              <a:schemeClr val="tx1"/>
+            </a:fontRef>
+          </p:style>
+        </p:cxnSp>
+        <p:cxnSp>
+          <p:nvCxnSpPr>
+            <p:cNvPr id="37" name="Straight Arrow Connector 36"/>
+            <p:cNvCxnSpPr/>
+            <p:nvPr/>
+          </p:nvCxnSpPr>
+          <p:spPr>
+            <a:xfrm flipH="1">
+              <a:off x="5439281" y="4016478"/>
+              <a:ext cx="827793" cy="398109"/>
+            </a:xfrm>
+            <a:prstGeom prst="straightConnector1">
+              <a:avLst/>
+            </a:prstGeom>
+            <a:ln w="38100">
+              <a:solidFill>
+                <a:schemeClr val="accent2">
+                  <a:lumMod val="60000"/>
+                  <a:lumOff val="40000"/>
+                </a:schemeClr>
+              </a:solidFill>
+              <a:headEnd type="arrow" w="med" len="med"/>
+              <a:tailEnd type="none" w="med" len="med"/>
+            </a:ln>
+          </p:spPr>
+          <p:style>
+            <a:lnRef idx="1">
+              <a:schemeClr val="accent1"/>
+            </a:lnRef>
+            <a:fillRef idx="0">
+              <a:schemeClr val="accent1"/>
+            </a:fillRef>
+            <a:effectRef idx="0">
+              <a:schemeClr val="accent1"/>
+            </a:effectRef>
+            <a:fontRef idx="minor">
+              <a:schemeClr val="tx1"/>
+            </a:fontRef>
+          </p:style>
+        </p:cxnSp>
+        <p:cxnSp>
+          <p:nvCxnSpPr>
+            <p:cNvPr id="41" name="Straight Arrow Connector 40"/>
+            <p:cNvCxnSpPr/>
+            <p:nvPr/>
+          </p:nvCxnSpPr>
+          <p:spPr>
+            <a:xfrm>
+              <a:off x="5370115" y="3058985"/>
+              <a:ext cx="827793" cy="354878"/>
+            </a:xfrm>
+            <a:prstGeom prst="straightConnector1">
+              <a:avLst/>
+            </a:prstGeom>
+            <a:ln w="38100">
+              <a:solidFill>
+                <a:schemeClr val="accent2">
+                  <a:lumMod val="60000"/>
+                  <a:lumOff val="40000"/>
+                </a:schemeClr>
+              </a:solidFill>
+              <a:headEnd type="arrow" w="med" len="med"/>
+              <a:tailEnd type="none" w="med" len="med"/>
+            </a:ln>
+          </p:spPr>
+          <p:style>
+            <a:lnRef idx="1">
+              <a:schemeClr val="accent1"/>
+            </a:lnRef>
+            <a:fillRef idx="0">
+              <a:schemeClr val="accent1"/>
+            </a:fillRef>
+            <a:effectRef idx="0">
+              <a:schemeClr val="accent1"/>
+            </a:effectRef>
+            <a:fontRef idx="minor">
+              <a:schemeClr val="tx1"/>
+            </a:fontRef>
+          </p:style>
+        </p:cxnSp>
+        <p:sp>
+          <p:nvSpPr>
+            <p:cNvPr id="24" name="TextBox 23"/>
+            <p:cNvSpPr txBox="1"/>
+            <p:nvPr/>
+          </p:nvSpPr>
+          <p:spPr>
+            <a:xfrm>
+              <a:off x="2876542" y="2867092"/>
+              <a:ext cx="609212" cy="369332"/>
+            </a:xfrm>
+            <a:prstGeom prst="rect">
+              <a:avLst/>
+            </a:prstGeom>
+            <a:noFill/>
+          </p:spPr>
+          <p:txBody>
+            <a:bodyPr wrap="square" rtlCol="0">
+              <a:spAutoFit/>
+            </a:bodyPr>
+            <a:lstStyle/>
+            <a:p>
+              <a:r>
+                <a:rPr lang="en-SG" i="1" dirty="0"/>
+                <a:t>Sees</a:t>
+              </a:r>
+            </a:p>
+          </p:txBody>
+        </p:sp>
+        <p:sp>
+          <p:nvSpPr>
+            <p:cNvPr id="47" name="TextBox 46"/>
+            <p:cNvSpPr txBox="1"/>
+            <p:nvPr/>
+          </p:nvSpPr>
+          <p:spPr>
+            <a:xfrm>
+              <a:off x="2435192" y="4307036"/>
+              <a:ext cx="999280" cy="369332"/>
+            </a:xfrm>
+            <a:prstGeom prst="rect">
+              <a:avLst/>
+            </a:prstGeom>
+            <a:noFill/>
+          </p:spPr>
+          <p:txBody>
+            <a:bodyPr wrap="square" rtlCol="0">
+              <a:spAutoFit/>
+            </a:bodyPr>
+            <a:lstStyle/>
+            <a:p>
+              <a:r>
+                <a:rPr lang="en-SG" i="1" dirty="0"/>
+                <a:t>Interacts</a:t>
+              </a:r>
+            </a:p>
+          </p:txBody>
+        </p:sp>
+        <p:sp>
+          <p:nvSpPr>
+            <p:cNvPr id="48" name="TextBox 47"/>
+            <p:cNvSpPr txBox="1"/>
+            <p:nvPr/>
+          </p:nvSpPr>
+          <p:spPr>
+            <a:xfrm>
+              <a:off x="5561119" y="4307036"/>
+              <a:ext cx="1360662" cy="369332"/>
+            </a:xfrm>
+            <a:prstGeom prst="rect">
+              <a:avLst/>
+            </a:prstGeom>
+            <a:noFill/>
+          </p:spPr>
+          <p:txBody>
+            <a:bodyPr wrap="square" rtlCol="0">
+              <a:spAutoFit/>
+            </a:bodyPr>
+            <a:lstStyle/>
+            <a:p>
+              <a:r>
+                <a:rPr lang="en-SG" i="1" dirty="0"/>
+                <a:t>Manipulates</a:t>
+              </a:r>
+            </a:p>
+          </p:txBody>
+        </p:sp>
+        <p:sp>
+          <p:nvSpPr>
+            <p:cNvPr id="49" name="TextBox 48"/>
+            <p:cNvSpPr txBox="1"/>
+            <p:nvPr/>
+          </p:nvSpPr>
+          <p:spPr>
+            <a:xfrm>
+              <a:off x="5803988" y="2867092"/>
+              <a:ext cx="999280" cy="369332"/>
+            </a:xfrm>
+            <a:prstGeom prst="rect">
+              <a:avLst/>
+            </a:prstGeom>
+            <a:noFill/>
+          </p:spPr>
+          <p:txBody>
+            <a:bodyPr wrap="square" rtlCol="0">
+              <a:spAutoFit/>
+            </a:bodyPr>
+            <a:lstStyle/>
+            <a:p>
+              <a:r>
+                <a:rPr lang="en-SG" i="1" dirty="0"/>
+                <a:t>Updates</a:t>
+              </a:r>
+            </a:p>
+          </p:txBody>
+        </p:sp>
+      </p:grpSp>
+    </p:spTree>
+    <p:extLst>
+      <p:ext uri="{BB962C8B-B14F-4D97-AF65-F5344CB8AC3E}">
+        <p14:creationId xmlns:p14="http://schemas.microsoft.com/office/powerpoint/2010/main" val="2395715797"/>
+      </p:ext>
+    </p:extLst>
+  </p:cSld>
+  <p:clrMapOvr>
+    <a:masterClrMapping/>
+  </p:clrMapOvr>
+</p:sld>
+</file>
+
+<file path=ppt/slides/slide2.xml><?xml version="1.0" encoding="utf-8"?>
+<p:sld xmlns:a="http://schemas.openxmlformats.org/drawingml/2006/main" xmlns:r="http://schemas.openxmlformats.org/officeDocument/2006/relationships" xmlns:p="http://schemas.openxmlformats.org/presentationml/2006/main">
+  <p:cSld>
+    <p:spTree>
+      <p:nvGrpSpPr>
+        <p:cNvPr id="1" name=""/>
+        <p:cNvGrpSpPr/>
+        <p:nvPr/>
+      </p:nvGrpSpPr>
+      <p:grpSpPr>
+        <a:xfrm>
+          <a:off x="0" y="0"/>
+          <a:ext cx="0" cy="0"/>
+          <a:chOff x="0" y="0"/>
+          <a:chExt cx="0" cy="0"/>
+        </a:xfrm>
+      </p:grpSpPr>
+      <p:sp>
+        <p:nvSpPr>
+          <p:cNvPr id="4" name="TextBox 3"/>
+          <p:cNvSpPr txBox="1"/>
+          <p:nvPr/>
+        </p:nvSpPr>
+        <p:spPr>
+          <a:xfrm>
+            <a:off x="0" y="0"/>
+            <a:ext cx="1599477" cy="369332"/>
+          </a:xfrm>
+          <a:prstGeom prst="rect">
+            <a:avLst/>
+          </a:prstGeom>
+          <a:noFill/>
+        </p:spPr>
+        <p:txBody>
+          <a:bodyPr wrap="none" rtlCol="0">
+            <a:spAutoFit/>
+          </a:bodyPr>
+          <a:lstStyle/>
+          <a:p>
+            <a:r>
+              <a:rPr lang="en-SG" dirty="0">
+                <a:latin typeface="Garamond" panose="02020404030301010803" pitchFamily="18" charset="0"/>
+              </a:rPr>
+              <a:t>Model Diagram</a:t>
+            </a:r>
+          </a:p>
+        </p:txBody>
+      </p:sp>
+      <p:grpSp>
+        <p:nvGrpSpPr>
+          <p:cNvPr id="62" name="Group 61"/>
+          <p:cNvGrpSpPr/>
+          <p:nvPr/>
+        </p:nvGrpSpPr>
+        <p:grpSpPr>
+          <a:xfrm>
+            <a:off x="775378" y="1923068"/>
+            <a:ext cx="10631054" cy="3101419"/>
+            <a:chOff x="775378" y="1923068"/>
+            <a:chExt cx="10631054" cy="3101419"/>
+          </a:xfrm>
+        </p:grpSpPr>
+        <p:sp>
+          <p:nvSpPr>
+            <p:cNvPr id="5" name="Rectangle: Rounded Corners 4"/>
+            <p:cNvSpPr/>
+            <p:nvPr/>
+          </p:nvSpPr>
+          <p:spPr>
+            <a:xfrm>
+              <a:off x="3547887" y="1923068"/>
+              <a:ext cx="7858545" cy="3101419"/>
+            </a:xfrm>
+            <a:prstGeom prst="roundRect">
+              <a:avLst/>
+            </a:prstGeom>
+            <a:ln/>
+          </p:spPr>
+          <p:style>
+            <a:lnRef idx="2">
+              <a:schemeClr val="accent6"/>
+            </a:lnRef>
+            <a:fillRef idx="1">
+              <a:schemeClr val="lt1"/>
+            </a:fillRef>
+            <a:effectRef idx="0">
+              <a:schemeClr val="accent6"/>
+            </a:effectRef>
+            <a:fontRef idx="minor">
+              <a:schemeClr val="dk1"/>
+            </a:fontRef>
+          </p:style>
+          <p:txBody>
+            <a:bodyPr rtlCol="0" anchor="ctr"/>
+            <a:lstStyle/>
+            <a:p>
+              <a:pPr algn="ctr"/>
+              <a:r>
+                <a:rPr lang="en-SG" dirty="0"/>
+                <a:t> </a:t>
+              </a:r>
+            </a:p>
+          </p:txBody>
+        </p:sp>
+        <p:sp>
+          <p:nvSpPr>
+            <p:cNvPr id="25" name="Rectangle: Rounded Corners 24"/>
+            <p:cNvSpPr/>
+            <p:nvPr/>
+          </p:nvSpPr>
+          <p:spPr>
+            <a:xfrm>
+              <a:off x="775378" y="2320191"/>
+              <a:ext cx="1451727" cy="785293"/>
+            </a:xfrm>
+            <a:prstGeom prst="roundRect">
+              <a:avLst/>
+            </a:prstGeom>
+            <a:solidFill>
+              <a:schemeClr val="bg1"/>
+            </a:solidFill>
+            <a:ln w="19050">
+              <a:solidFill>
+                <a:schemeClr val="accent2"/>
+              </a:solidFill>
+            </a:ln>
+          </p:spPr>
+          <p:style>
+            <a:lnRef idx="2">
+              <a:schemeClr val="accent2"/>
+            </a:lnRef>
+            <a:fillRef idx="1">
+              <a:schemeClr val="lt1"/>
+            </a:fillRef>
+            <a:effectRef idx="0">
+              <a:schemeClr val="accent2"/>
+            </a:effectRef>
+            <a:fontRef idx="minor">
+              <a:schemeClr val="dk1"/>
+            </a:fontRef>
+          </p:style>
+          <p:txBody>
+            <a:bodyPr rtlCol="0" anchor="ctr"/>
+            <a:lstStyle/>
+            <a:p>
+              <a:pPr algn="ctr"/>
+              <a:r>
+                <a:rPr lang="en-SG" dirty="0">
+                  <a:solidFill>
+                    <a:schemeClr val="accent2"/>
+                  </a:solidFill>
+                </a:rPr>
+                <a:t>View</a:t>
+              </a:r>
+            </a:p>
+          </p:txBody>
+        </p:sp>
+        <p:sp>
+          <p:nvSpPr>
+            <p:cNvPr id="32" name="Rectangle: Rounded Corners 31"/>
+            <p:cNvSpPr/>
+            <p:nvPr/>
+          </p:nvSpPr>
+          <p:spPr>
+            <a:xfrm>
+              <a:off x="775379" y="3843875"/>
+              <a:ext cx="1451727" cy="785293"/>
+            </a:xfrm>
+            <a:prstGeom prst="roundRect">
+              <a:avLst/>
+            </a:prstGeom>
+            <a:ln w="19050"/>
+          </p:spPr>
+          <p:style>
+            <a:lnRef idx="2">
+              <a:schemeClr val="accent1"/>
+            </a:lnRef>
+            <a:fillRef idx="1">
+              <a:schemeClr val="lt1"/>
+            </a:fillRef>
+            <a:effectRef idx="0">
+              <a:schemeClr val="accent1"/>
+            </a:effectRef>
+            <a:fontRef idx="minor">
+              <a:schemeClr val="dk1"/>
+            </a:fontRef>
+          </p:style>
+          <p:txBody>
+            <a:bodyPr rtlCol="0" anchor="ctr"/>
+            <a:lstStyle/>
+            <a:p>
+              <a:pPr algn="ctr"/>
+              <a:r>
+                <a:rPr lang="en-SG" dirty="0">
+                  <a:solidFill>
+                    <a:schemeClr val="accent1"/>
+                  </a:solidFill>
+                </a:rPr>
+                <a:t>Controller</a:t>
+              </a:r>
+            </a:p>
+          </p:txBody>
+        </p:sp>
+        <p:sp>
+          <p:nvSpPr>
+            <p:cNvPr id="2" name="TextBox 1"/>
+            <p:cNvSpPr txBox="1"/>
+            <p:nvPr/>
+          </p:nvSpPr>
+          <p:spPr>
+            <a:xfrm>
+              <a:off x="3827283" y="2014591"/>
+              <a:ext cx="867266" cy="367646"/>
+            </a:xfrm>
+            <a:prstGeom prst="rect">
+              <a:avLst/>
+            </a:prstGeom>
+            <a:noFill/>
+          </p:spPr>
+          <p:txBody>
+            <a:bodyPr wrap="square" rtlCol="0">
+              <a:spAutoFit/>
+            </a:bodyPr>
+            <a:lstStyle/>
+            <a:p>
+              <a:r>
+                <a:rPr lang="en-SG" dirty="0">
+                  <a:solidFill>
+                    <a:schemeClr val="accent6"/>
+                  </a:solidFill>
+                </a:rPr>
+                <a:t>Model</a:t>
+              </a:r>
+            </a:p>
+          </p:txBody>
+        </p:sp>
+        <p:sp>
+          <p:nvSpPr>
+            <p:cNvPr id="7" name="Rectangle 6"/>
+            <p:cNvSpPr/>
+            <p:nvPr/>
+          </p:nvSpPr>
+          <p:spPr>
+            <a:xfrm>
+              <a:off x="3827283" y="2494490"/>
+              <a:ext cx="1414020" cy="841422"/>
+            </a:xfrm>
+            <a:prstGeom prst="rect">
+              <a:avLst/>
+            </a:prstGeom>
+            <a:gradFill>
+              <a:gsLst>
+                <a:gs pos="8000">
+                  <a:schemeClr val="accent6">
+                    <a:lumMod val="60000"/>
+                    <a:lumOff val="40000"/>
+                  </a:schemeClr>
+                </a:gs>
+                <a:gs pos="100000">
+                  <a:schemeClr val="accent6">
+                    <a:lumMod val="20000"/>
+                    <a:lumOff val="80000"/>
+                  </a:schemeClr>
+                </a:gs>
+              </a:gsLst>
+              <a:lin ang="5400000" scaled="1"/>
+            </a:gradFill>
+            <a:ln w="12700">
+              <a:solidFill>
+                <a:schemeClr val="accent6">
+                  <a:lumMod val="75000"/>
+                </a:schemeClr>
+              </a:solidFill>
+            </a:ln>
+          </p:spPr>
+          <p:style>
+            <a:lnRef idx="1">
+              <a:schemeClr val="accent6"/>
+            </a:lnRef>
+            <a:fillRef idx="2">
+              <a:schemeClr val="accent6"/>
+            </a:fillRef>
+            <a:effectRef idx="1">
+              <a:schemeClr val="accent6"/>
+            </a:effectRef>
+            <a:fontRef idx="minor">
+              <a:schemeClr val="dk1"/>
+            </a:fontRef>
+          </p:style>
+          <p:txBody>
+            <a:bodyPr rtlCol="0" anchor="ctr"/>
+            <a:lstStyle/>
+            <a:p>
+              <a:pPr algn="ctr"/>
+              <a:r>
+                <a:rPr lang="en-SG" dirty="0">
+                  <a:solidFill>
+                    <a:schemeClr val="accent6"/>
+                  </a:solidFill>
+                </a:rPr>
+                <a:t>Schedule</a:t>
+              </a:r>
+            </a:p>
+          </p:txBody>
+        </p:sp>
+        <p:cxnSp>
+          <p:nvCxnSpPr>
+            <p:cNvPr id="9" name="Straight Arrow Connector 8"/>
+            <p:cNvCxnSpPr/>
+            <p:nvPr/>
+          </p:nvCxnSpPr>
+          <p:spPr>
+            <a:xfrm>
+              <a:off x="5241303" y="2912884"/>
+              <a:ext cx="556182" cy="0"/>
+            </a:xfrm>
+            <a:prstGeom prst="straightConnector1">
+              <a:avLst/>
+            </a:prstGeom>
+            <a:ln w="19050">
+              <a:solidFill>
+                <a:schemeClr val="accent6"/>
+              </a:solidFill>
+              <a:headEnd type="none" w="med" len="med"/>
+              <a:tailEnd type="arrow" w="med" len="med"/>
+            </a:ln>
+          </p:spPr>
+          <p:style>
+            <a:lnRef idx="1">
+              <a:schemeClr val="accent1"/>
+            </a:lnRef>
+            <a:fillRef idx="0">
+              <a:schemeClr val="accent1"/>
+            </a:fillRef>
+            <a:effectRef idx="0">
+              <a:schemeClr val="accent1"/>
+            </a:effectRef>
+            <a:fontRef idx="minor">
+              <a:schemeClr val="tx1"/>
+            </a:fontRef>
+          </p:style>
+        </p:cxnSp>
+        <p:sp>
+          <p:nvSpPr>
+            <p:cNvPr id="23" name="Rectangle 22"/>
+            <p:cNvSpPr/>
+            <p:nvPr/>
+          </p:nvSpPr>
+          <p:spPr>
+            <a:xfrm>
+              <a:off x="5806912" y="2492173"/>
+              <a:ext cx="1414020" cy="841422"/>
+            </a:xfrm>
+            <a:prstGeom prst="rect">
+              <a:avLst/>
+            </a:prstGeom>
+            <a:gradFill>
+              <a:gsLst>
+                <a:gs pos="8000">
+                  <a:schemeClr val="accent6">
+                    <a:lumMod val="60000"/>
+                    <a:lumOff val="40000"/>
+                  </a:schemeClr>
+                </a:gs>
+                <a:gs pos="100000">
+                  <a:schemeClr val="accent6">
+                    <a:lumMod val="20000"/>
+                    <a:lumOff val="80000"/>
+                  </a:schemeClr>
+                </a:gs>
+              </a:gsLst>
+              <a:lin ang="5400000" scaled="1"/>
+            </a:gradFill>
+            <a:ln w="12700">
+              <a:solidFill>
+                <a:schemeClr val="accent6">
+                  <a:lumMod val="75000"/>
+                </a:schemeClr>
+              </a:solidFill>
+            </a:ln>
+          </p:spPr>
+          <p:style>
+            <a:lnRef idx="1">
+              <a:schemeClr val="accent6"/>
+            </a:lnRef>
+            <a:fillRef idx="2">
+              <a:schemeClr val="accent6"/>
+            </a:fillRef>
+            <a:effectRef idx="1">
+              <a:schemeClr val="accent6"/>
+            </a:effectRef>
+            <a:fontRef idx="minor">
+              <a:schemeClr val="dk1"/>
+            </a:fontRef>
+          </p:style>
+          <p:txBody>
+            <a:bodyPr rtlCol="0" anchor="ctr"/>
+            <a:lstStyle/>
+            <a:p>
+              <a:pPr algn="ctr"/>
+              <a:r>
+                <a:rPr lang="en-SG" dirty="0">
+                  <a:solidFill>
+                    <a:schemeClr val="accent6"/>
+                  </a:solidFill>
+                </a:rPr>
+                <a:t>State</a:t>
+              </a:r>
+            </a:p>
+          </p:txBody>
+        </p:sp>
+        <p:sp>
+          <p:nvSpPr>
+            <p:cNvPr id="10" name="Diamond 9"/>
+            <p:cNvSpPr/>
+            <p:nvPr/>
+          </p:nvSpPr>
+          <p:spPr>
+            <a:xfrm>
+              <a:off x="5250730" y="2818616"/>
+              <a:ext cx="311084" cy="188536"/>
+            </a:xfrm>
+            <a:prstGeom prst="diamond">
+              <a:avLst/>
+            </a:prstGeom>
+          </p:spPr>
+          <p:style>
+            <a:lnRef idx="2">
+              <a:schemeClr val="accent6">
+                <a:shade val="50000"/>
+              </a:schemeClr>
+            </a:lnRef>
+            <a:fillRef idx="1">
+              <a:schemeClr val="accent6"/>
+            </a:fillRef>
+            <a:effectRef idx="0">
+              <a:schemeClr val="accent6"/>
+            </a:effectRef>
+            <a:fontRef idx="minor">
+              <a:schemeClr val="lt1"/>
+            </a:fontRef>
+          </p:style>
+          <p:txBody>
+            <a:bodyPr rtlCol="0" anchor="ctr"/>
+            <a:lstStyle/>
+            <a:p>
+              <a:pPr algn="ctr"/>
+              <a:endParaRPr lang="en-SG"/>
+            </a:p>
+          </p:txBody>
+        </p:sp>
+        <p:cxnSp>
+          <p:nvCxnSpPr>
+            <p:cNvPr id="26" name="Straight Arrow Connector 25"/>
+            <p:cNvCxnSpPr/>
+            <p:nvPr/>
+          </p:nvCxnSpPr>
+          <p:spPr>
+            <a:xfrm>
+              <a:off x="7231924" y="2914454"/>
+              <a:ext cx="556182" cy="0"/>
+            </a:xfrm>
+            <a:prstGeom prst="straightConnector1">
+              <a:avLst/>
+            </a:prstGeom>
+            <a:ln w="19050">
+              <a:solidFill>
+                <a:schemeClr val="accent6"/>
+              </a:solidFill>
+              <a:headEnd type="none" w="med" len="med"/>
+              <a:tailEnd type="arrow" w="med" len="med"/>
+            </a:ln>
+          </p:spPr>
+          <p:style>
+            <a:lnRef idx="1">
+              <a:schemeClr val="accent1"/>
+            </a:lnRef>
+            <a:fillRef idx="0">
+              <a:schemeClr val="accent1"/>
+            </a:fillRef>
+            <a:effectRef idx="0">
+              <a:schemeClr val="accent1"/>
+            </a:effectRef>
+            <a:fontRef idx="minor">
+              <a:schemeClr val="tx1"/>
+            </a:fontRef>
+          </p:style>
+        </p:cxnSp>
+        <p:sp>
+          <p:nvSpPr>
+            <p:cNvPr id="27" name="Rectangle 26"/>
+            <p:cNvSpPr/>
+            <p:nvPr/>
+          </p:nvSpPr>
+          <p:spPr>
+            <a:xfrm>
+              <a:off x="7797533" y="2493743"/>
+              <a:ext cx="1414020" cy="841422"/>
+            </a:xfrm>
+            <a:prstGeom prst="rect">
+              <a:avLst/>
+            </a:prstGeom>
+            <a:gradFill>
+              <a:gsLst>
+                <a:gs pos="8000">
+                  <a:schemeClr val="accent6">
+                    <a:lumMod val="60000"/>
+                    <a:lumOff val="40000"/>
+                  </a:schemeClr>
+                </a:gs>
+                <a:gs pos="100000">
+                  <a:schemeClr val="accent6">
+                    <a:lumMod val="20000"/>
+                    <a:lumOff val="80000"/>
+                  </a:schemeClr>
+                </a:gs>
+              </a:gsLst>
+              <a:lin ang="5400000" scaled="1"/>
+            </a:gradFill>
+            <a:ln w="12700">
+              <a:solidFill>
+                <a:schemeClr val="accent6">
+                  <a:lumMod val="75000"/>
+                </a:schemeClr>
+              </a:solidFill>
+            </a:ln>
+          </p:spPr>
+          <p:style>
+            <a:lnRef idx="1">
+              <a:schemeClr val="accent6"/>
+            </a:lnRef>
+            <a:fillRef idx="2">
+              <a:schemeClr val="accent6"/>
+            </a:fillRef>
+            <a:effectRef idx="1">
+              <a:schemeClr val="accent6"/>
+            </a:effectRef>
+            <a:fontRef idx="minor">
+              <a:schemeClr val="dk1"/>
+            </a:fontRef>
+          </p:style>
+          <p:txBody>
+            <a:bodyPr rtlCol="0" anchor="ctr"/>
+            <a:lstStyle/>
+            <a:p>
+              <a:pPr algn="ctr"/>
+              <a:r>
+                <a:rPr lang="en-SG" dirty="0">
+                  <a:solidFill>
+                    <a:schemeClr val="accent6"/>
+                  </a:solidFill>
+                </a:rPr>
+                <a:t>Task</a:t>
+              </a:r>
+            </a:p>
+          </p:txBody>
+        </p:sp>
+        <p:sp>
+          <p:nvSpPr>
+            <p:cNvPr id="28" name="Diamond 27"/>
+            <p:cNvSpPr/>
+            <p:nvPr/>
+          </p:nvSpPr>
+          <p:spPr>
+            <a:xfrm>
+              <a:off x="7241351" y="2820186"/>
+              <a:ext cx="311084" cy="188536"/>
+            </a:xfrm>
+            <a:prstGeom prst="diamond">
+              <a:avLst/>
+            </a:prstGeom>
+          </p:spPr>
+          <p:style>
+            <a:lnRef idx="2">
+              <a:schemeClr val="accent6">
+                <a:shade val="50000"/>
+              </a:schemeClr>
+            </a:lnRef>
+            <a:fillRef idx="1">
+              <a:schemeClr val="accent6"/>
+            </a:fillRef>
+            <a:effectRef idx="0">
+              <a:schemeClr val="accent6"/>
+            </a:effectRef>
+            <a:fontRef idx="minor">
+              <a:schemeClr val="lt1"/>
+            </a:fontRef>
+          </p:style>
+          <p:txBody>
+            <a:bodyPr rtlCol="0" anchor="ctr"/>
+            <a:lstStyle/>
+            <a:p>
+              <a:pPr algn="ctr"/>
+              <a:endParaRPr lang="en-SG"/>
+            </a:p>
+          </p:txBody>
+        </p:sp>
+        <p:cxnSp>
+          <p:nvCxnSpPr>
+            <p:cNvPr id="29" name="Straight Arrow Connector 28"/>
+            <p:cNvCxnSpPr/>
+            <p:nvPr/>
+          </p:nvCxnSpPr>
+          <p:spPr>
+            <a:xfrm>
+              <a:off x="9192703" y="2914452"/>
+              <a:ext cx="556182" cy="0"/>
+            </a:xfrm>
+            <a:prstGeom prst="straightConnector1">
+              <a:avLst/>
+            </a:prstGeom>
+            <a:ln w="19050">
+              <a:solidFill>
+                <a:schemeClr val="accent6"/>
+              </a:solidFill>
+              <a:headEnd type="none" w="med" len="med"/>
+              <a:tailEnd type="arrow" w="med" len="med"/>
+            </a:ln>
+          </p:spPr>
+          <p:style>
+            <a:lnRef idx="1">
+              <a:schemeClr val="accent1"/>
+            </a:lnRef>
+            <a:fillRef idx="0">
+              <a:schemeClr val="accent1"/>
+            </a:fillRef>
+            <a:effectRef idx="0">
+              <a:schemeClr val="accent1"/>
+            </a:effectRef>
+            <a:fontRef idx="minor">
+              <a:schemeClr val="tx1"/>
+            </a:fontRef>
+          </p:style>
+        </p:cxnSp>
+        <p:sp>
+          <p:nvSpPr>
+            <p:cNvPr id="30" name="Rectangle 29"/>
+            <p:cNvSpPr/>
+            <p:nvPr/>
+          </p:nvSpPr>
+          <p:spPr>
+            <a:xfrm>
+              <a:off x="9758312" y="2493741"/>
+              <a:ext cx="1414020" cy="841422"/>
+            </a:xfrm>
+            <a:prstGeom prst="rect">
+              <a:avLst/>
+            </a:prstGeom>
+            <a:gradFill>
+              <a:gsLst>
+                <a:gs pos="8000">
+                  <a:schemeClr val="accent6">
+                    <a:lumMod val="60000"/>
+                    <a:lumOff val="40000"/>
+                  </a:schemeClr>
+                </a:gs>
+                <a:gs pos="100000">
+                  <a:schemeClr val="accent6">
+                    <a:lumMod val="20000"/>
+                    <a:lumOff val="80000"/>
+                  </a:schemeClr>
+                </a:gs>
+              </a:gsLst>
+              <a:lin ang="5400000" scaled="1"/>
+            </a:gradFill>
+            <a:ln w="12700">
+              <a:solidFill>
+                <a:schemeClr val="accent6">
+                  <a:lumMod val="75000"/>
+                </a:schemeClr>
+              </a:solidFill>
+            </a:ln>
+          </p:spPr>
+          <p:style>
+            <a:lnRef idx="1">
+              <a:schemeClr val="accent6"/>
+            </a:lnRef>
+            <a:fillRef idx="2">
+              <a:schemeClr val="accent6"/>
+            </a:fillRef>
+            <a:effectRef idx="1">
+              <a:schemeClr val="accent6"/>
+            </a:effectRef>
+            <a:fontRef idx="minor">
+              <a:schemeClr val="dk1"/>
+            </a:fontRef>
+          </p:style>
+          <p:txBody>
+            <a:bodyPr rtlCol="0" anchor="ctr"/>
+            <a:lstStyle/>
+            <a:p>
+              <a:pPr algn="ctr"/>
+              <a:r>
+                <a:rPr lang="en-SG" dirty="0">
+                  <a:solidFill>
+                    <a:schemeClr val="accent6"/>
+                  </a:solidFill>
+                </a:rPr>
+                <a:t>Reminder</a:t>
+              </a:r>
+            </a:p>
+          </p:txBody>
+        </p:sp>
+        <p:sp>
+          <p:nvSpPr>
+            <p:cNvPr id="31" name="Diamond 30"/>
+            <p:cNvSpPr/>
+            <p:nvPr/>
+          </p:nvSpPr>
+          <p:spPr>
+            <a:xfrm>
+              <a:off x="9202130" y="2820184"/>
+              <a:ext cx="311084" cy="188536"/>
+            </a:xfrm>
+            <a:prstGeom prst="diamond">
+              <a:avLst/>
+            </a:prstGeom>
+          </p:spPr>
+          <p:style>
+            <a:lnRef idx="2">
+              <a:schemeClr val="accent6">
+                <a:shade val="50000"/>
+              </a:schemeClr>
+            </a:lnRef>
+            <a:fillRef idx="1">
+              <a:schemeClr val="accent6"/>
+            </a:fillRef>
+            <a:effectRef idx="0">
+              <a:schemeClr val="accent6"/>
+            </a:effectRef>
+            <a:fontRef idx="minor">
+              <a:schemeClr val="lt1"/>
+            </a:fontRef>
+          </p:style>
+          <p:txBody>
+            <a:bodyPr rtlCol="0" anchor="ctr"/>
+            <a:lstStyle/>
+            <a:p>
+              <a:pPr algn="ctr"/>
+              <a:endParaRPr lang="en-SG"/>
+            </a:p>
+          </p:txBody>
+        </p:sp>
+        <p:sp>
+          <p:nvSpPr>
+            <p:cNvPr id="33" name="Rectangle 32"/>
+            <p:cNvSpPr/>
+            <p:nvPr/>
+          </p:nvSpPr>
+          <p:spPr>
+            <a:xfrm>
+              <a:off x="3838279" y="3815811"/>
+              <a:ext cx="1414020" cy="841422"/>
+            </a:xfrm>
+            <a:prstGeom prst="rect">
+              <a:avLst/>
+            </a:prstGeom>
+            <a:gradFill>
+              <a:gsLst>
+                <a:gs pos="8000">
+                  <a:schemeClr val="accent6">
+                    <a:lumMod val="60000"/>
+                    <a:lumOff val="40000"/>
+                  </a:schemeClr>
+                </a:gs>
+                <a:gs pos="100000">
+                  <a:schemeClr val="accent6">
+                    <a:lumMod val="20000"/>
+                    <a:lumOff val="80000"/>
+                  </a:schemeClr>
+                </a:gs>
+              </a:gsLst>
+              <a:lin ang="5400000" scaled="1"/>
+            </a:gradFill>
+            <a:ln w="12700">
+              <a:solidFill>
+                <a:schemeClr val="accent6">
+                  <a:lumMod val="75000"/>
+                </a:schemeClr>
+              </a:solidFill>
+            </a:ln>
+          </p:spPr>
+          <p:style>
+            <a:lnRef idx="1">
+              <a:schemeClr val="accent6"/>
+            </a:lnRef>
+            <a:fillRef idx="2">
+              <a:schemeClr val="accent6"/>
+            </a:fillRef>
+            <a:effectRef idx="1">
+              <a:schemeClr val="accent6"/>
+            </a:effectRef>
+            <a:fontRef idx="minor">
+              <a:schemeClr val="dk1"/>
+            </a:fontRef>
+          </p:style>
+          <p:txBody>
+            <a:bodyPr rtlCol="0" anchor="ctr"/>
+            <a:lstStyle/>
+            <a:p>
+              <a:pPr algn="ctr"/>
+              <a:r>
+                <a:rPr lang="en-SG" dirty="0">
+                  <a:solidFill>
+                    <a:schemeClr val="accent6"/>
+                  </a:solidFill>
+                </a:rPr>
+                <a:t>Storage</a:t>
+              </a:r>
+            </a:p>
+          </p:txBody>
+        </p:sp>
+        <p:sp>
+          <p:nvSpPr>
+            <p:cNvPr id="34" name="Rectangle 33"/>
+            <p:cNvSpPr/>
+            <p:nvPr/>
+          </p:nvSpPr>
+          <p:spPr>
+            <a:xfrm>
+              <a:off x="5806912" y="3815811"/>
+              <a:ext cx="2218447" cy="841422"/>
+            </a:xfrm>
+            <a:prstGeom prst="rect">
+              <a:avLst/>
+            </a:prstGeom>
+            <a:ln/>
+          </p:spPr>
+          <p:style>
+            <a:lnRef idx="2">
+              <a:schemeClr val="accent6"/>
+            </a:lnRef>
+            <a:fillRef idx="1">
+              <a:schemeClr val="lt1"/>
+            </a:fillRef>
+            <a:effectRef idx="0">
+              <a:schemeClr val="accent6"/>
+            </a:effectRef>
+            <a:fontRef idx="minor">
+              <a:schemeClr val="dk1"/>
+            </a:fontRef>
+          </p:style>
+          <p:txBody>
+            <a:bodyPr rtlCol="0" anchor="ctr"/>
+            <a:lstStyle/>
+            <a:p>
+              <a:pPr algn="ctr"/>
+              <a:r>
+                <a:rPr lang="en-SG" dirty="0">
+                  <a:solidFill>
+                    <a:schemeClr val="accent6"/>
+                  </a:solidFill>
+                </a:rPr>
+                <a:t>XMLScheduleStorage</a:t>
+              </a:r>
+            </a:p>
+          </p:txBody>
+        </p:sp>
+        <p:cxnSp>
+          <p:nvCxnSpPr>
+            <p:cNvPr id="13" name="Straight Arrow Connector 12"/>
+            <p:cNvCxnSpPr>
+              <a:stCxn id="34" idx="1"/>
+              <a:endCxn id="33" idx="3"/>
+            </p:cNvCxnSpPr>
+            <p:nvPr/>
+          </p:nvCxnSpPr>
+          <p:spPr>
+            <a:xfrm flipH="1">
+              <a:off x="5252299" y="4236522"/>
+              <a:ext cx="554613" cy="0"/>
+            </a:xfrm>
+            <a:prstGeom prst="straightConnector1">
+              <a:avLst/>
+            </a:prstGeom>
+            <a:ln w="19050">
+              <a:prstDash val="dash"/>
+              <a:headEnd type="none" w="med" len="med"/>
+              <a:tailEnd type="triangle" w="med" len="med"/>
+            </a:ln>
+          </p:spPr>
+          <p:style>
+            <a:lnRef idx="1">
+              <a:schemeClr val="accent6"/>
+            </a:lnRef>
+            <a:fillRef idx="0">
+              <a:schemeClr val="accent6"/>
+            </a:fillRef>
+            <a:effectRef idx="0">
+              <a:schemeClr val="accent6"/>
+            </a:effectRef>
+            <a:fontRef idx="minor">
+              <a:schemeClr val="tx1"/>
+            </a:fontRef>
+          </p:style>
+        </p:cxnSp>
+        <p:cxnSp>
+          <p:nvCxnSpPr>
+            <p:cNvPr id="38" name="Straight Arrow Connector 37"/>
+            <p:cNvCxnSpPr/>
+            <p:nvPr/>
+          </p:nvCxnSpPr>
+          <p:spPr>
+            <a:xfrm flipH="1">
+              <a:off x="2296119" y="4236522"/>
+              <a:ext cx="1205622" cy="8078"/>
+            </a:xfrm>
+            <a:prstGeom prst="straightConnector1">
+              <a:avLst/>
+            </a:prstGeom>
+            <a:ln w="38100">
+              <a:solidFill>
+                <a:schemeClr val="accent2">
+                  <a:lumMod val="60000"/>
+                  <a:lumOff val="40000"/>
+                </a:schemeClr>
+              </a:solidFill>
+              <a:headEnd type="arrow" w="med" len="med"/>
+              <a:tailEnd type="none" w="med" len="med"/>
+            </a:ln>
+          </p:spPr>
+          <p:style>
+            <a:lnRef idx="1">
+              <a:schemeClr val="accent1"/>
+            </a:lnRef>
+            <a:fillRef idx="0">
+              <a:schemeClr val="accent1"/>
+            </a:fillRef>
+            <a:effectRef idx="0">
+              <a:schemeClr val="accent1"/>
+            </a:effectRef>
+            <a:fontRef idx="minor">
+              <a:schemeClr val="tx1"/>
+            </a:fontRef>
+          </p:style>
+        </p:cxnSp>
+        <p:cxnSp>
+          <p:nvCxnSpPr>
+            <p:cNvPr id="39" name="Straight Arrow Connector 38"/>
+            <p:cNvCxnSpPr/>
+            <p:nvPr/>
+          </p:nvCxnSpPr>
+          <p:spPr>
+            <a:xfrm>
+              <a:off x="2307758" y="2712837"/>
+              <a:ext cx="1134295" cy="9429"/>
+            </a:xfrm>
+            <a:prstGeom prst="straightConnector1">
+              <a:avLst/>
+            </a:prstGeom>
+            <a:ln w="38100">
+              <a:solidFill>
+                <a:schemeClr val="accent2">
+                  <a:lumMod val="60000"/>
+                  <a:lumOff val="40000"/>
+                </a:schemeClr>
+              </a:solidFill>
+              <a:headEnd type="arrow" w="med" len="med"/>
+              <a:tailEnd type="none" w="med" len="med"/>
+            </a:ln>
+          </p:spPr>
+          <p:style>
+            <a:lnRef idx="1">
+              <a:schemeClr val="accent1"/>
+            </a:lnRef>
+            <a:fillRef idx="0">
+              <a:schemeClr val="accent1"/>
+            </a:fillRef>
+            <a:effectRef idx="0">
+              <a:schemeClr val="accent1"/>
+            </a:effectRef>
+            <a:fontRef idx="minor">
+              <a:schemeClr val="tx1"/>
+            </a:fontRef>
+          </p:style>
+        </p:cxnSp>
+        <p:sp>
+          <p:nvSpPr>
+            <p:cNvPr id="50" name="TextBox 49"/>
+            <p:cNvSpPr txBox="1"/>
+            <p:nvPr/>
+          </p:nvSpPr>
+          <p:spPr>
+            <a:xfrm>
+              <a:off x="2194575" y="4287901"/>
+              <a:ext cx="1360662" cy="369332"/>
+            </a:xfrm>
+            <a:prstGeom prst="rect">
+              <a:avLst/>
+            </a:prstGeom>
+            <a:noFill/>
+          </p:spPr>
+          <p:txBody>
+            <a:bodyPr wrap="square" rtlCol="0">
+              <a:spAutoFit/>
+            </a:bodyPr>
+            <a:lstStyle/>
+            <a:p>
+              <a:r>
+                <a:rPr lang="en-SG" i="1" dirty="0"/>
+                <a:t>Manipulates</a:t>
+              </a:r>
+            </a:p>
+          </p:txBody>
+        </p:sp>
+        <p:sp>
+          <p:nvSpPr>
+            <p:cNvPr id="61" name="TextBox 60"/>
+            <p:cNvSpPr txBox="1"/>
+            <p:nvPr/>
+          </p:nvSpPr>
+          <p:spPr>
+            <a:xfrm>
+              <a:off x="2426058" y="2712837"/>
+              <a:ext cx="999280" cy="369332"/>
+            </a:xfrm>
+            <a:prstGeom prst="rect">
+              <a:avLst/>
+            </a:prstGeom>
+            <a:noFill/>
+          </p:spPr>
+          <p:txBody>
+            <a:bodyPr wrap="square" rtlCol="0">
+              <a:spAutoFit/>
+            </a:bodyPr>
+            <a:lstStyle/>
+            <a:p>
+              <a:r>
+                <a:rPr lang="en-SG" i="1" dirty="0"/>
+                <a:t>Updates</a:t>
+              </a:r>
+            </a:p>
+          </p:txBody>
+        </p:sp>
+      </p:grpSp>
+    </p:spTree>
+    <p:extLst>
+      <p:ext uri="{BB962C8B-B14F-4D97-AF65-F5344CB8AC3E}">
+        <p14:creationId xmlns:p14="http://schemas.microsoft.com/office/powerpoint/2010/main" val="865566284"/>
+      </p:ext>
+    </p:extLst>
+  </p:cSld>
+  <p:clrMapOvr>
+    <a:masterClrMapping/>
+  </p:clrMapOvr>
+</p:sld>
+</file>
+
+<file path=ppt/slides/slide3.xml><?xml version="1.0" encoding="utf-8"?>
+<p:sld xmlns:a="http://schemas.openxmlformats.org/drawingml/2006/main" xmlns:r="http://schemas.openxmlformats.org/officeDocument/2006/relationships" xmlns:p="http://schemas.openxmlformats.org/presentationml/2006/main">
+  <p:cSld>
+    <p:spTree>
+      <p:nvGrpSpPr>
+        <p:cNvPr id="1" name=""/>
+        <p:cNvGrpSpPr/>
+        <p:nvPr/>
+      </p:nvGrpSpPr>
+      <p:grpSpPr>
+        <a:xfrm>
+          <a:off x="0" y="0"/>
+          <a:ext cx="0" cy="0"/>
+          <a:chOff x="0" y="0"/>
+          <a:chExt cx="0" cy="0"/>
+        </a:xfrm>
+      </p:grpSpPr>
+      <p:sp>
+        <p:nvSpPr>
+          <p:cNvPr id="4" name="TextBox 3"/>
+          <p:cNvSpPr txBox="1"/>
+          <p:nvPr/>
+        </p:nvSpPr>
+        <p:spPr>
+          <a:xfrm>
+            <a:off x="0" y="0"/>
+            <a:ext cx="1485663" cy="369332"/>
+          </a:xfrm>
+          <a:prstGeom prst="rect">
+            <a:avLst/>
+          </a:prstGeom>
+          <a:noFill/>
+        </p:spPr>
+        <p:txBody>
+          <a:bodyPr wrap="none" rtlCol="0">
+            <a:spAutoFit/>
+          </a:bodyPr>
+          <a:lstStyle/>
+          <a:p>
+            <a:r>
+              <a:rPr lang="en-SG" dirty="0">
+                <a:latin typeface="Garamond" panose="02020404030301010803" pitchFamily="18" charset="0"/>
+              </a:rPr>
+              <a:t>View Diagram</a:t>
+            </a:r>
+          </a:p>
+        </p:txBody>
+      </p:sp>
+      <p:grpSp>
+        <p:nvGrpSpPr>
+          <p:cNvPr id="18" name="Group 17"/>
+          <p:cNvGrpSpPr/>
+          <p:nvPr/>
+        </p:nvGrpSpPr>
+        <p:grpSpPr>
+          <a:xfrm>
+            <a:off x="449946" y="1436912"/>
+            <a:ext cx="11287451" cy="4794069"/>
+            <a:chOff x="449946" y="1436912"/>
+            <a:chExt cx="11287451" cy="4794069"/>
+          </a:xfrm>
+        </p:grpSpPr>
+        <p:sp>
+          <p:nvSpPr>
+            <p:cNvPr id="25" name="Rectangle: Rounded Corners 24"/>
+            <p:cNvSpPr/>
+            <p:nvPr/>
+          </p:nvSpPr>
+          <p:spPr>
+            <a:xfrm>
+              <a:off x="2360874" y="1436912"/>
+              <a:ext cx="6521868" cy="4794069"/>
+            </a:xfrm>
+            <a:prstGeom prst="roundRect">
+              <a:avLst/>
+            </a:prstGeom>
+            <a:solidFill>
+              <a:schemeClr val="bg1"/>
+            </a:solidFill>
+            <a:ln w="19050">
+              <a:solidFill>
+                <a:schemeClr val="accent2"/>
+              </a:solidFill>
+            </a:ln>
+          </p:spPr>
+          <p:style>
+            <a:lnRef idx="2">
+              <a:schemeClr val="accent2"/>
+            </a:lnRef>
+            <a:fillRef idx="1">
+              <a:schemeClr val="lt1"/>
+            </a:fillRef>
+            <a:effectRef idx="0">
+              <a:schemeClr val="accent2"/>
+            </a:effectRef>
+            <a:fontRef idx="minor">
+              <a:schemeClr val="dk1"/>
+            </a:fontRef>
+          </p:style>
+          <p:txBody>
+            <a:bodyPr rtlCol="0" anchor="ctr"/>
+            <a:lstStyle/>
+            <a:p>
+              <a:pPr algn="ctr"/>
+              <a:endParaRPr lang="en-SG" dirty="0">
+                <a:solidFill>
+                  <a:schemeClr val="accent2"/>
+                </a:solidFill>
+              </a:endParaRPr>
+            </a:p>
+          </p:txBody>
+        </p:sp>
+        <p:sp>
+          <p:nvSpPr>
+            <p:cNvPr id="7" name="Rectangle 6"/>
+            <p:cNvSpPr/>
+            <p:nvPr/>
+          </p:nvSpPr>
+          <p:spPr>
+            <a:xfrm>
+              <a:off x="2574420" y="2139638"/>
+              <a:ext cx="1625807" cy="841422"/>
+            </a:xfrm>
+            <a:prstGeom prst="rect">
+              <a:avLst/>
+            </a:prstGeom>
+            <a:gradFill>
+              <a:gsLst>
+                <a:gs pos="29000">
+                  <a:schemeClr val="accent2">
+                    <a:lumMod val="60000"/>
+                    <a:lumOff val="40000"/>
+                  </a:schemeClr>
+                </a:gs>
+                <a:gs pos="100000">
+                  <a:schemeClr val="accent2">
+                    <a:lumMod val="20000"/>
+                    <a:lumOff val="80000"/>
+                  </a:schemeClr>
+                </a:gs>
+              </a:gsLst>
+              <a:lin ang="5400000" scaled="1"/>
+            </a:gradFill>
+            <a:ln w="12700">
+              <a:solidFill>
+                <a:schemeClr val="accent2"/>
+              </a:solidFill>
+            </a:ln>
+          </p:spPr>
+          <p:style>
+            <a:lnRef idx="1">
+              <a:schemeClr val="accent6"/>
+            </a:lnRef>
+            <a:fillRef idx="2">
+              <a:schemeClr val="accent6"/>
+            </a:fillRef>
+            <a:effectRef idx="1">
+              <a:schemeClr val="accent6"/>
+            </a:effectRef>
+            <a:fontRef idx="minor">
+              <a:schemeClr val="dk1"/>
+            </a:fontRef>
+          </p:style>
+          <p:txBody>
+            <a:bodyPr rtlCol="0" anchor="ctr"/>
+            <a:lstStyle/>
+            <a:p>
+              <a:pPr algn="ctr"/>
+              <a:r>
+                <a:rPr lang="en-SG" dirty="0">
+                  <a:solidFill>
+                    <a:schemeClr val="accent2"/>
+                  </a:solidFill>
+                </a:rPr>
+                <a:t>MainWindow</a:t>
+              </a:r>
+            </a:p>
+          </p:txBody>
+        </p:sp>
+        <p:cxnSp>
+          <p:nvCxnSpPr>
+            <p:cNvPr id="9" name="Straight Arrow Connector 8"/>
+            <p:cNvCxnSpPr/>
+            <p:nvPr/>
+          </p:nvCxnSpPr>
+          <p:spPr>
+            <a:xfrm>
+              <a:off x="3366313" y="3675628"/>
+              <a:ext cx="812904" cy="8095"/>
+            </a:xfrm>
+            <a:prstGeom prst="straightConnector1">
+              <a:avLst/>
+            </a:prstGeom>
+            <a:ln>
+              <a:headEnd type="none" w="med" len="med"/>
+              <a:tailEnd type="arrow" w="med" len="med"/>
+            </a:ln>
+          </p:spPr>
+          <p:style>
+            <a:lnRef idx="2">
+              <a:schemeClr val="accent2"/>
+            </a:lnRef>
+            <a:fillRef idx="0">
+              <a:schemeClr val="accent2"/>
+            </a:fillRef>
+            <a:effectRef idx="1">
+              <a:schemeClr val="accent2"/>
+            </a:effectRef>
+            <a:fontRef idx="minor">
+              <a:schemeClr val="tx1"/>
+            </a:fontRef>
+          </p:style>
+        </p:cxnSp>
+        <p:sp>
+          <p:nvSpPr>
+            <p:cNvPr id="10" name="Diamond 9"/>
+            <p:cNvSpPr/>
+            <p:nvPr/>
+          </p:nvSpPr>
+          <p:spPr>
+            <a:xfrm>
+              <a:off x="3231781" y="2995135"/>
+              <a:ext cx="269064" cy="375080"/>
+            </a:xfrm>
+            <a:prstGeom prst="diamond">
+              <a:avLst/>
+            </a:prstGeom>
+          </p:spPr>
+          <p:style>
+            <a:lnRef idx="2">
+              <a:schemeClr val="accent2">
+                <a:shade val="50000"/>
+              </a:schemeClr>
+            </a:lnRef>
+            <a:fillRef idx="1">
+              <a:schemeClr val="accent2"/>
+            </a:fillRef>
+            <a:effectRef idx="0">
+              <a:schemeClr val="accent2"/>
+            </a:effectRef>
+            <a:fontRef idx="minor">
+              <a:schemeClr val="lt1"/>
+            </a:fontRef>
+          </p:style>
+          <p:txBody>
+            <a:bodyPr rtlCol="0" anchor="ctr"/>
+            <a:lstStyle/>
+            <a:p>
+              <a:pPr algn="ctr"/>
+              <a:endParaRPr lang="en-SG"/>
+            </a:p>
+          </p:txBody>
+        </p:sp>
+        <p:sp>
+          <p:nvSpPr>
+            <p:cNvPr id="24" name="TextBox 23"/>
+            <p:cNvSpPr txBox="1"/>
+            <p:nvPr/>
+          </p:nvSpPr>
+          <p:spPr>
+            <a:xfrm>
+              <a:off x="2771258" y="1603609"/>
+              <a:ext cx="867266" cy="369332"/>
+            </a:xfrm>
+            <a:prstGeom prst="rect">
+              <a:avLst/>
+            </a:prstGeom>
+            <a:noFill/>
+          </p:spPr>
+          <p:txBody>
+            <a:bodyPr wrap="square" rtlCol="0">
+              <a:spAutoFit/>
+            </a:bodyPr>
+            <a:lstStyle/>
+            <a:p>
+              <a:r>
+                <a:rPr lang="en-SG" dirty="0">
+                  <a:solidFill>
+                    <a:schemeClr val="accent2"/>
+                  </a:solidFill>
+                </a:rPr>
+                <a:t>View</a:t>
+              </a:r>
+            </a:p>
+          </p:txBody>
+        </p:sp>
+        <p:sp>
+          <p:nvSpPr>
+            <p:cNvPr id="36" name="Rectangle: Rounded Corners 35"/>
+            <p:cNvSpPr/>
+            <p:nvPr/>
+          </p:nvSpPr>
+          <p:spPr>
+            <a:xfrm>
+              <a:off x="10285670" y="3216503"/>
+              <a:ext cx="1451727" cy="785293"/>
+            </a:xfrm>
+            <a:prstGeom prst="roundRect">
+              <a:avLst/>
+            </a:prstGeom>
+            <a:ln w="19050"/>
+          </p:spPr>
+          <p:style>
+            <a:lnRef idx="2">
+              <a:schemeClr val="accent6"/>
+            </a:lnRef>
+            <a:fillRef idx="1">
+              <a:schemeClr val="lt1"/>
+            </a:fillRef>
+            <a:effectRef idx="0">
+              <a:schemeClr val="accent6"/>
+            </a:effectRef>
+            <a:fontRef idx="minor">
+              <a:schemeClr val="dk1"/>
+            </a:fontRef>
+          </p:style>
+          <p:txBody>
+            <a:bodyPr rtlCol="0" anchor="ctr"/>
+            <a:lstStyle/>
+            <a:p>
+              <a:pPr algn="ctr"/>
+              <a:r>
+                <a:rPr lang="en-SG" dirty="0">
+                  <a:solidFill>
+                    <a:schemeClr val="accent6"/>
+                  </a:solidFill>
+                </a:rPr>
+                <a:t>Model</a:t>
+              </a:r>
+            </a:p>
+          </p:txBody>
+        </p:sp>
+        <p:sp>
+          <p:nvSpPr>
+            <p:cNvPr id="37" name="Rectangle 36"/>
+            <p:cNvSpPr/>
+            <p:nvPr/>
+          </p:nvSpPr>
+          <p:spPr>
+            <a:xfrm>
+              <a:off x="4200228" y="3185968"/>
+              <a:ext cx="1625806" cy="841422"/>
+            </a:xfrm>
+            <a:prstGeom prst="rect">
+              <a:avLst/>
+            </a:prstGeom>
+            <a:gradFill>
+              <a:gsLst>
+                <a:gs pos="29000">
+                  <a:schemeClr val="accent2">
+                    <a:lumMod val="60000"/>
+                    <a:lumOff val="40000"/>
+                  </a:schemeClr>
+                </a:gs>
+                <a:gs pos="100000">
+                  <a:schemeClr val="accent2">
+                    <a:lumMod val="20000"/>
+                    <a:lumOff val="80000"/>
+                  </a:schemeClr>
+                </a:gs>
+              </a:gsLst>
+              <a:lin ang="5400000" scaled="1"/>
+            </a:gradFill>
+            <a:ln w="12700">
+              <a:solidFill>
+                <a:schemeClr val="accent2"/>
+              </a:solidFill>
+            </a:ln>
+          </p:spPr>
+          <p:style>
+            <a:lnRef idx="1">
+              <a:schemeClr val="accent6"/>
+            </a:lnRef>
+            <a:fillRef idx="2">
+              <a:schemeClr val="accent6"/>
+            </a:fillRef>
+            <a:effectRef idx="1">
+              <a:schemeClr val="accent6"/>
+            </a:effectRef>
+            <a:fontRef idx="minor">
+              <a:schemeClr val="dk1"/>
+            </a:fontRef>
+          </p:style>
+          <p:txBody>
+            <a:bodyPr rtlCol="0" anchor="ctr"/>
+            <a:lstStyle/>
+            <a:p>
+              <a:pPr algn="ctr"/>
+              <a:r>
+                <a:rPr lang="en-SG" dirty="0">
+                  <a:solidFill>
+                    <a:schemeClr val="accent2"/>
+                  </a:solidFill>
+                </a:rPr>
+                <a:t>CommandBox</a:t>
+              </a:r>
+            </a:p>
+          </p:txBody>
+        </p:sp>
+        <p:sp>
+          <p:nvSpPr>
+            <p:cNvPr id="40" name="Rectangle 39"/>
+            <p:cNvSpPr/>
+            <p:nvPr/>
+          </p:nvSpPr>
+          <p:spPr>
+            <a:xfrm>
+              <a:off x="4200227" y="4170181"/>
+              <a:ext cx="1625807" cy="841422"/>
+            </a:xfrm>
+            <a:prstGeom prst="rect">
+              <a:avLst/>
+            </a:prstGeom>
+            <a:gradFill>
+              <a:gsLst>
+                <a:gs pos="29000">
+                  <a:schemeClr val="accent2">
+                    <a:lumMod val="60000"/>
+                    <a:lumOff val="40000"/>
+                  </a:schemeClr>
+                </a:gs>
+                <a:gs pos="100000">
+                  <a:schemeClr val="accent2">
+                    <a:lumMod val="20000"/>
+                    <a:lumOff val="80000"/>
+                  </a:schemeClr>
+                </a:gs>
+              </a:gsLst>
+              <a:lin ang="5400000" scaled="1"/>
+            </a:gradFill>
+            <a:ln w="12700">
+              <a:solidFill>
+                <a:schemeClr val="accent2"/>
+              </a:solidFill>
+            </a:ln>
+          </p:spPr>
+          <p:style>
+            <a:lnRef idx="1">
+              <a:schemeClr val="accent6"/>
+            </a:lnRef>
+            <a:fillRef idx="2">
+              <a:schemeClr val="accent6"/>
+            </a:fillRef>
+            <a:effectRef idx="1">
+              <a:schemeClr val="accent6"/>
+            </a:effectRef>
+            <a:fontRef idx="minor">
+              <a:schemeClr val="dk1"/>
+            </a:fontRef>
+          </p:style>
+          <p:txBody>
+            <a:bodyPr rtlCol="0" anchor="ctr"/>
+            <a:lstStyle/>
+            <a:p>
+              <a:pPr algn="ctr"/>
+              <a:r>
+                <a:rPr lang="en-SG" dirty="0">
+                  <a:solidFill>
+                    <a:schemeClr val="accent2"/>
+                  </a:solidFill>
+                </a:rPr>
+                <a:t>ResultPanel</a:t>
+              </a:r>
+            </a:p>
+          </p:txBody>
+        </p:sp>
+        <p:sp>
+          <p:nvSpPr>
+            <p:cNvPr id="41" name="Rectangle 40"/>
+            <p:cNvSpPr/>
+            <p:nvPr/>
+          </p:nvSpPr>
+          <p:spPr>
+            <a:xfrm>
+              <a:off x="4200227" y="5216511"/>
+              <a:ext cx="1625807" cy="841422"/>
+            </a:xfrm>
+            <a:prstGeom prst="rect">
+              <a:avLst/>
+            </a:prstGeom>
+            <a:gradFill>
+              <a:gsLst>
+                <a:gs pos="29000">
+                  <a:schemeClr val="accent2">
+                    <a:lumMod val="60000"/>
+                    <a:lumOff val="40000"/>
+                  </a:schemeClr>
+                </a:gs>
+                <a:gs pos="100000">
+                  <a:schemeClr val="accent2">
+                    <a:lumMod val="20000"/>
+                    <a:lumOff val="80000"/>
+                  </a:schemeClr>
+                </a:gs>
+              </a:gsLst>
+              <a:lin ang="5400000" scaled="1"/>
+            </a:gradFill>
+            <a:ln w="12700">
+              <a:solidFill>
+                <a:schemeClr val="accent2"/>
+              </a:solidFill>
+            </a:ln>
+          </p:spPr>
+          <p:style>
+            <a:lnRef idx="1">
+              <a:schemeClr val="accent6"/>
+            </a:lnRef>
+            <a:fillRef idx="2">
+              <a:schemeClr val="accent6"/>
+            </a:fillRef>
+            <a:effectRef idx="1">
+              <a:schemeClr val="accent6"/>
+            </a:effectRef>
+            <a:fontRef idx="minor">
+              <a:schemeClr val="dk1"/>
+            </a:fontRef>
+          </p:style>
+          <p:txBody>
+            <a:bodyPr rtlCol="0" anchor="ctr"/>
+            <a:lstStyle/>
+            <a:p>
+              <a:pPr algn="ctr"/>
+              <a:r>
+                <a:rPr lang="en-SG" dirty="0">
+                  <a:solidFill>
+                    <a:schemeClr val="accent2"/>
+                  </a:solidFill>
+                </a:rPr>
+                <a:t>CalendarPanel</a:t>
+              </a:r>
+            </a:p>
+          </p:txBody>
+        </p:sp>
+        <p:sp>
+          <p:nvSpPr>
+            <p:cNvPr id="42" name="Rectangle 41"/>
+            <p:cNvSpPr/>
+            <p:nvPr/>
+          </p:nvSpPr>
+          <p:spPr>
+            <a:xfrm>
+              <a:off x="6335485" y="3185968"/>
+              <a:ext cx="2137769" cy="841422"/>
+            </a:xfrm>
+            <a:prstGeom prst="rect">
+              <a:avLst/>
+            </a:prstGeom>
+            <a:ln/>
+          </p:spPr>
+          <p:style>
+            <a:lnRef idx="2">
+              <a:schemeClr val="accent2"/>
+            </a:lnRef>
+            <a:fillRef idx="1">
+              <a:schemeClr val="lt1"/>
+            </a:fillRef>
+            <a:effectRef idx="0">
+              <a:schemeClr val="accent2"/>
+            </a:effectRef>
+            <a:fontRef idx="minor">
+              <a:schemeClr val="dk1"/>
+            </a:fontRef>
+          </p:style>
+          <p:txBody>
+            <a:bodyPr rtlCol="0" anchor="ctr"/>
+            <a:lstStyle/>
+            <a:p>
+              <a:pPr algn="ctr"/>
+              <a:r>
+                <a:rPr lang="en-SG" dirty="0">
+                  <a:solidFill>
+                    <a:schemeClr val="accent2"/>
+                  </a:solidFill>
+                </a:rPr>
+                <a:t>CommandBox.fxml</a:t>
+              </a:r>
+            </a:p>
+          </p:txBody>
+        </p:sp>
+        <p:sp>
+          <p:nvSpPr>
+            <p:cNvPr id="43" name="Rectangle 42"/>
+            <p:cNvSpPr/>
+            <p:nvPr/>
+          </p:nvSpPr>
+          <p:spPr>
+            <a:xfrm>
+              <a:off x="6322421" y="5247569"/>
+              <a:ext cx="2137769" cy="841422"/>
+            </a:xfrm>
+            <a:prstGeom prst="rect">
+              <a:avLst/>
+            </a:prstGeom>
+            <a:ln/>
+          </p:spPr>
+          <p:style>
+            <a:lnRef idx="2">
+              <a:schemeClr val="accent2"/>
+            </a:lnRef>
+            <a:fillRef idx="1">
+              <a:schemeClr val="lt1"/>
+            </a:fillRef>
+            <a:effectRef idx="0">
+              <a:schemeClr val="accent2"/>
+            </a:effectRef>
+            <a:fontRef idx="minor">
+              <a:schemeClr val="dk1"/>
+            </a:fontRef>
+          </p:style>
+          <p:txBody>
+            <a:bodyPr rtlCol="0" anchor="ctr"/>
+            <a:lstStyle/>
+            <a:p>
+              <a:pPr algn="ctr"/>
+              <a:r>
+                <a:rPr lang="en-SG" dirty="0">
+                  <a:solidFill>
+                    <a:schemeClr val="accent2"/>
+                  </a:solidFill>
+                </a:rPr>
+                <a:t>CalendarPanel.fxml</a:t>
+              </a:r>
+            </a:p>
+          </p:txBody>
+        </p:sp>
+        <p:sp>
+          <p:nvSpPr>
+            <p:cNvPr id="44" name="Rectangle 43"/>
+            <p:cNvSpPr/>
+            <p:nvPr/>
+          </p:nvSpPr>
+          <p:spPr>
+            <a:xfrm>
+              <a:off x="6322422" y="4201239"/>
+              <a:ext cx="2137769" cy="841422"/>
+            </a:xfrm>
+            <a:prstGeom prst="rect">
+              <a:avLst/>
+            </a:prstGeom>
+            <a:ln/>
+          </p:spPr>
+          <p:style>
+            <a:lnRef idx="2">
+              <a:schemeClr val="accent2"/>
+            </a:lnRef>
+            <a:fillRef idx="1">
+              <a:schemeClr val="lt1"/>
+            </a:fillRef>
+            <a:effectRef idx="0">
+              <a:schemeClr val="accent2"/>
+            </a:effectRef>
+            <a:fontRef idx="minor">
+              <a:schemeClr val="dk1"/>
+            </a:fontRef>
+          </p:style>
+          <p:txBody>
+            <a:bodyPr rtlCol="0" anchor="ctr"/>
+            <a:lstStyle/>
+            <a:p>
+              <a:pPr algn="ctr"/>
+              <a:r>
+                <a:rPr lang="en-SG" dirty="0">
+                  <a:solidFill>
+                    <a:schemeClr val="accent2"/>
+                  </a:solidFill>
+                </a:rPr>
+                <a:t>ResultPanel.fxml</a:t>
+              </a:r>
+            </a:p>
+          </p:txBody>
+        </p:sp>
+        <p:sp>
+          <p:nvSpPr>
+            <p:cNvPr id="45" name="Rectangle 44"/>
+            <p:cNvSpPr/>
+            <p:nvPr/>
+          </p:nvSpPr>
+          <p:spPr>
+            <a:xfrm>
+              <a:off x="6322422" y="2139638"/>
+              <a:ext cx="2137769" cy="841422"/>
+            </a:xfrm>
+            <a:prstGeom prst="rect">
+              <a:avLst/>
+            </a:prstGeom>
+            <a:ln/>
+          </p:spPr>
+          <p:style>
+            <a:lnRef idx="2">
+              <a:schemeClr val="accent2"/>
+            </a:lnRef>
+            <a:fillRef idx="1">
+              <a:schemeClr val="lt1"/>
+            </a:fillRef>
+            <a:effectRef idx="0">
+              <a:schemeClr val="accent2"/>
+            </a:effectRef>
+            <a:fontRef idx="minor">
+              <a:schemeClr val="dk1"/>
+            </a:fontRef>
+          </p:style>
+          <p:txBody>
+            <a:bodyPr rtlCol="0" anchor="ctr"/>
+            <a:lstStyle/>
+            <a:p>
+              <a:pPr algn="ctr"/>
+              <a:r>
+                <a:rPr lang="en-SG" dirty="0">
+                  <a:solidFill>
+                    <a:schemeClr val="accent2"/>
+                  </a:solidFill>
+                </a:rPr>
+                <a:t>MainWindow.fxml</a:t>
+              </a:r>
+            </a:p>
+          </p:txBody>
+        </p:sp>
+        <p:cxnSp>
+          <p:nvCxnSpPr>
+            <p:cNvPr id="6" name="Connector: Elbow 5"/>
+            <p:cNvCxnSpPr/>
+            <p:nvPr/>
+          </p:nvCxnSpPr>
+          <p:spPr>
+            <a:xfrm rot="16200000" flipH="1">
+              <a:off x="2435234" y="3916764"/>
+              <a:ext cx="2656162" cy="812903"/>
+            </a:xfrm>
+            <a:prstGeom prst="bentConnector2">
+              <a:avLst/>
+            </a:prstGeom>
+            <a:ln>
+              <a:headEnd type="none" w="med" len="med"/>
+              <a:tailEnd type="arrow" w="med" len="med"/>
+            </a:ln>
+          </p:spPr>
+          <p:style>
+            <a:lnRef idx="1">
+              <a:schemeClr val="accent2"/>
+            </a:lnRef>
+            <a:fillRef idx="0">
+              <a:schemeClr val="accent2"/>
+            </a:fillRef>
+            <a:effectRef idx="0">
+              <a:schemeClr val="accent2"/>
+            </a:effectRef>
+            <a:fontRef idx="minor">
+              <a:schemeClr val="tx1"/>
+            </a:fontRef>
+          </p:style>
+        </p:cxnSp>
+        <p:cxnSp>
+          <p:nvCxnSpPr>
+            <p:cNvPr id="46" name="Straight Arrow Connector 45"/>
+            <p:cNvCxnSpPr/>
+            <p:nvPr/>
+          </p:nvCxnSpPr>
+          <p:spPr>
+            <a:xfrm>
+              <a:off x="3387323" y="4621950"/>
+              <a:ext cx="812904" cy="8095"/>
+            </a:xfrm>
+            <a:prstGeom prst="straightConnector1">
+              <a:avLst/>
+            </a:prstGeom>
+            <a:ln>
+              <a:headEnd type="none" w="med" len="med"/>
+              <a:tailEnd type="arrow" w="med" len="med"/>
+            </a:ln>
+          </p:spPr>
+          <p:style>
+            <a:lnRef idx="2">
+              <a:schemeClr val="accent2"/>
+            </a:lnRef>
+            <a:fillRef idx="0">
+              <a:schemeClr val="accent2"/>
+            </a:fillRef>
+            <a:effectRef idx="1">
+              <a:schemeClr val="accent2"/>
+            </a:effectRef>
+            <a:fontRef idx="minor">
+              <a:schemeClr val="tx1"/>
+            </a:fontRef>
+          </p:style>
+        </p:cxnSp>
+        <p:cxnSp>
+          <p:nvCxnSpPr>
+            <p:cNvPr id="47" name="Straight Arrow Connector 46"/>
+            <p:cNvCxnSpPr>
+              <a:stCxn id="45" idx="1"/>
+              <a:endCxn id="7" idx="3"/>
+            </p:cNvCxnSpPr>
+            <p:nvPr/>
+          </p:nvCxnSpPr>
+          <p:spPr>
+            <a:xfrm flipH="1">
+              <a:off x="4200227" y="2560349"/>
+              <a:ext cx="2122195" cy="0"/>
+            </a:xfrm>
+            <a:prstGeom prst="straightConnector1">
+              <a:avLst/>
+            </a:prstGeom>
+            <a:ln>
+              <a:prstDash val="dash"/>
+              <a:headEnd type="none" w="med" len="med"/>
+              <a:tailEnd type="triangle" w="med" len="med"/>
+            </a:ln>
+          </p:spPr>
+          <p:style>
+            <a:lnRef idx="1">
+              <a:schemeClr val="accent2"/>
+            </a:lnRef>
+            <a:fillRef idx="0">
+              <a:schemeClr val="accent2"/>
+            </a:fillRef>
+            <a:effectRef idx="0">
+              <a:schemeClr val="accent2"/>
+            </a:effectRef>
+            <a:fontRef idx="minor">
+              <a:schemeClr val="tx1"/>
+            </a:fontRef>
+          </p:style>
+        </p:cxnSp>
+        <p:cxnSp>
+          <p:nvCxnSpPr>
+            <p:cNvPr id="49" name="Straight Arrow Connector 48"/>
+            <p:cNvCxnSpPr/>
+            <p:nvPr/>
+          </p:nvCxnSpPr>
+          <p:spPr>
+            <a:xfrm flipH="1">
+              <a:off x="5826034" y="3683723"/>
+              <a:ext cx="475379" cy="0"/>
+            </a:xfrm>
+            <a:prstGeom prst="straightConnector1">
+              <a:avLst/>
+            </a:prstGeom>
+            <a:ln>
+              <a:prstDash val="dash"/>
+              <a:headEnd type="none" w="med" len="med"/>
+              <a:tailEnd type="triangle" w="med" len="med"/>
+            </a:ln>
+          </p:spPr>
+          <p:style>
+            <a:lnRef idx="1">
+              <a:schemeClr val="accent2"/>
+            </a:lnRef>
+            <a:fillRef idx="0">
+              <a:schemeClr val="accent2"/>
+            </a:fillRef>
+            <a:effectRef idx="0">
+              <a:schemeClr val="accent2"/>
+            </a:effectRef>
+            <a:fontRef idx="minor">
+              <a:schemeClr val="tx1"/>
+            </a:fontRef>
+          </p:style>
+        </p:cxnSp>
+        <p:cxnSp>
+          <p:nvCxnSpPr>
+            <p:cNvPr id="51" name="Straight Arrow Connector 50"/>
+            <p:cNvCxnSpPr/>
+            <p:nvPr/>
+          </p:nvCxnSpPr>
+          <p:spPr>
+            <a:xfrm flipH="1">
+              <a:off x="5826034" y="4604533"/>
+              <a:ext cx="475379" cy="0"/>
+            </a:xfrm>
+            <a:prstGeom prst="straightConnector1">
+              <a:avLst/>
+            </a:prstGeom>
+            <a:ln>
+              <a:prstDash val="dash"/>
+              <a:headEnd type="none" w="med" len="med"/>
+              <a:tailEnd type="triangle" w="med" len="med"/>
+            </a:ln>
+          </p:spPr>
+          <p:style>
+            <a:lnRef idx="1">
+              <a:schemeClr val="accent2"/>
+            </a:lnRef>
+            <a:fillRef idx="0">
+              <a:schemeClr val="accent2"/>
+            </a:fillRef>
+            <a:effectRef idx="0">
+              <a:schemeClr val="accent2"/>
+            </a:effectRef>
+            <a:fontRef idx="minor">
+              <a:schemeClr val="tx1"/>
+            </a:fontRef>
+          </p:style>
+        </p:cxnSp>
+        <p:cxnSp>
+          <p:nvCxnSpPr>
+            <p:cNvPr id="52" name="Straight Arrow Connector 51"/>
+            <p:cNvCxnSpPr/>
+            <p:nvPr/>
+          </p:nvCxnSpPr>
+          <p:spPr>
+            <a:xfrm flipH="1">
+              <a:off x="5826034" y="5622568"/>
+              <a:ext cx="475379" cy="0"/>
+            </a:xfrm>
+            <a:prstGeom prst="straightConnector1">
+              <a:avLst/>
+            </a:prstGeom>
+            <a:ln>
+              <a:prstDash val="dash"/>
+              <a:headEnd type="none" w="med" len="med"/>
+              <a:tailEnd type="triangle" w="med" len="med"/>
+            </a:ln>
+          </p:spPr>
+          <p:style>
+            <a:lnRef idx="1">
+              <a:schemeClr val="accent2"/>
+            </a:lnRef>
+            <a:fillRef idx="0">
+              <a:schemeClr val="accent2"/>
+            </a:fillRef>
+            <a:effectRef idx="0">
+              <a:schemeClr val="accent2"/>
+            </a:effectRef>
+            <a:fontRef idx="minor">
+              <a:schemeClr val="tx1"/>
+            </a:fontRef>
+          </p:style>
+        </p:cxnSp>
+        <p:grpSp>
+          <p:nvGrpSpPr>
+            <p:cNvPr id="53" name="Group 52"/>
+            <p:cNvGrpSpPr/>
+            <p:nvPr/>
+          </p:nvGrpSpPr>
+          <p:grpSpPr>
+            <a:xfrm>
+              <a:off x="449946" y="3268403"/>
+              <a:ext cx="508000" cy="808389"/>
+              <a:chOff x="2622102" y="2866883"/>
+              <a:chExt cx="508000" cy="808389"/>
+            </a:xfrm>
+          </p:grpSpPr>
+          <p:sp>
+            <p:nvSpPr>
+              <p:cNvPr id="54" name="Smiley Face 53"/>
+              <p:cNvSpPr/>
+              <p:nvPr/>
+            </p:nvSpPr>
+            <p:spPr>
+              <a:xfrm>
+                <a:off x="2622102" y="2866883"/>
+                <a:ext cx="508000" cy="480291"/>
+              </a:xfrm>
+              <a:prstGeom prst="smileyFace">
+                <a:avLst/>
+              </a:prstGeom>
+              <a:solidFill>
+                <a:schemeClr val="accent2">
+                  <a:lumMod val="20000"/>
+                  <a:lumOff val="80000"/>
+                </a:schemeClr>
+              </a:solidFill>
+              <a:ln>
+                <a:solidFill>
+                  <a:schemeClr val="bg2">
+                    <a:lumMod val="50000"/>
+                  </a:schemeClr>
+                </a:solidFill>
+              </a:ln>
+            </p:spPr>
+            <p:style>
+              <a:lnRef idx="1">
+                <a:schemeClr val="accent3"/>
+              </a:lnRef>
+              <a:fillRef idx="2">
+                <a:schemeClr val="accent3"/>
+              </a:fillRef>
+              <a:effectRef idx="1">
+                <a:schemeClr val="accent3"/>
+              </a:effectRef>
+              <a:fontRef idx="minor">
+                <a:schemeClr val="dk1"/>
+              </a:fontRef>
+            </p:style>
+            <p:txBody>
+              <a:bodyPr rtlCol="0" anchor="ctr"/>
+              <a:lstStyle/>
+              <a:p>
+                <a:pPr algn="ctr"/>
+                <a:endParaRPr lang="en-SG" dirty="0"/>
+              </a:p>
+            </p:txBody>
+          </p:sp>
+          <p:sp>
+            <p:nvSpPr>
+              <p:cNvPr id="55" name="TextBox 54"/>
+              <p:cNvSpPr txBox="1"/>
+              <p:nvPr/>
+            </p:nvSpPr>
+            <p:spPr>
+              <a:xfrm>
+                <a:off x="2629880" y="3305940"/>
+                <a:ext cx="492443" cy="369332"/>
+              </a:xfrm>
+              <a:prstGeom prst="rect">
+                <a:avLst/>
+              </a:prstGeom>
+              <a:noFill/>
+            </p:spPr>
+            <p:txBody>
+              <a:bodyPr wrap="none" rtlCol="0">
+                <a:spAutoFit/>
+              </a:bodyPr>
+              <a:lstStyle/>
+              <a:p>
+                <a:r>
+                  <a:rPr lang="en-SG" dirty="0">
+                    <a:solidFill>
+                      <a:schemeClr val="bg2">
+                        <a:lumMod val="50000"/>
+                      </a:schemeClr>
+                    </a:solidFill>
+                    <a:latin typeface="Garamond" panose="02020404030301010803" pitchFamily="18" charset="0"/>
+                  </a:rPr>
+                  <a:t>Jim</a:t>
+                </a:r>
+              </a:p>
+            </p:txBody>
+          </p:sp>
+        </p:grpSp>
+        <p:cxnSp>
+          <p:nvCxnSpPr>
+            <p:cNvPr id="56" name="Straight Arrow Connector 55"/>
+            <p:cNvCxnSpPr/>
+            <p:nvPr/>
+          </p:nvCxnSpPr>
+          <p:spPr>
+            <a:xfrm>
+              <a:off x="1109585" y="3525245"/>
+              <a:ext cx="1134295" cy="9429"/>
+            </a:xfrm>
+            <a:prstGeom prst="straightConnector1">
+              <a:avLst/>
+            </a:prstGeom>
+            <a:ln w="38100">
+              <a:solidFill>
+                <a:schemeClr val="accent2">
+                  <a:lumMod val="60000"/>
+                  <a:lumOff val="40000"/>
+                </a:schemeClr>
+              </a:solidFill>
+              <a:headEnd type="arrow" w="med" len="med"/>
+              <a:tailEnd type="none" w="med" len="med"/>
+            </a:ln>
+          </p:spPr>
+          <p:style>
+            <a:lnRef idx="1">
+              <a:schemeClr val="accent1"/>
+            </a:lnRef>
+            <a:fillRef idx="0">
+              <a:schemeClr val="accent1"/>
+            </a:fillRef>
+            <a:effectRef idx="0">
+              <a:schemeClr val="accent1"/>
+            </a:effectRef>
+            <a:fontRef idx="minor">
+              <a:schemeClr val="tx1"/>
+            </a:fontRef>
+          </p:style>
+        </p:cxnSp>
+        <p:sp>
+          <p:nvSpPr>
+            <p:cNvPr id="57" name="TextBox 56"/>
+            <p:cNvSpPr txBox="1"/>
+            <p:nvPr/>
+          </p:nvSpPr>
+          <p:spPr>
+            <a:xfrm>
+              <a:off x="1412557" y="3579634"/>
+              <a:ext cx="609212" cy="369332"/>
+            </a:xfrm>
+            <a:prstGeom prst="rect">
+              <a:avLst/>
+            </a:prstGeom>
+            <a:noFill/>
+          </p:spPr>
+          <p:txBody>
+            <a:bodyPr wrap="square" rtlCol="0">
+              <a:spAutoFit/>
+            </a:bodyPr>
+            <a:lstStyle/>
+            <a:p>
+              <a:r>
+                <a:rPr lang="en-SG" i="1" dirty="0"/>
+                <a:t>Sees</a:t>
+              </a:r>
+            </a:p>
+          </p:txBody>
+        </p:sp>
+        <p:cxnSp>
+          <p:nvCxnSpPr>
+            <p:cNvPr id="58" name="Straight Arrow Connector 57"/>
+            <p:cNvCxnSpPr/>
+            <p:nvPr/>
+          </p:nvCxnSpPr>
+          <p:spPr>
+            <a:xfrm>
+              <a:off x="8982705" y="3499119"/>
+              <a:ext cx="1134295" cy="9429"/>
+            </a:xfrm>
+            <a:prstGeom prst="straightConnector1">
+              <a:avLst/>
+            </a:prstGeom>
+            <a:ln w="38100">
+              <a:solidFill>
+                <a:schemeClr val="accent2">
+                  <a:lumMod val="60000"/>
+                  <a:lumOff val="40000"/>
+                </a:schemeClr>
+              </a:solidFill>
+              <a:headEnd type="arrow" w="med" len="med"/>
+              <a:tailEnd type="none" w="med" len="med"/>
+            </a:ln>
+          </p:spPr>
+          <p:style>
+            <a:lnRef idx="1">
+              <a:schemeClr val="accent1"/>
+            </a:lnRef>
+            <a:fillRef idx="0">
+              <a:schemeClr val="accent1"/>
+            </a:fillRef>
+            <a:effectRef idx="0">
+              <a:schemeClr val="accent1"/>
+            </a:effectRef>
+            <a:fontRef idx="minor">
+              <a:schemeClr val="tx1"/>
+            </a:fontRef>
+          </p:style>
+        </p:cxnSp>
+        <p:sp>
+          <p:nvSpPr>
+            <p:cNvPr id="59" name="TextBox 58"/>
+            <p:cNvSpPr txBox="1"/>
+            <p:nvPr/>
+          </p:nvSpPr>
+          <p:spPr>
+            <a:xfrm>
+              <a:off x="9117720" y="3579634"/>
+              <a:ext cx="999280" cy="369332"/>
+            </a:xfrm>
+            <a:prstGeom prst="rect">
+              <a:avLst/>
+            </a:prstGeom>
+            <a:noFill/>
+          </p:spPr>
+          <p:txBody>
+            <a:bodyPr wrap="square" rtlCol="0">
+              <a:spAutoFit/>
+            </a:bodyPr>
+            <a:lstStyle/>
+            <a:p>
+              <a:r>
+                <a:rPr lang="en-SG" i="1" dirty="0"/>
+                <a:t>Updates</a:t>
+              </a:r>
+            </a:p>
+          </p:txBody>
+        </p:sp>
+      </p:grpSp>
+    </p:spTree>
+    <p:extLst>
+      <p:ext uri="{BB962C8B-B14F-4D97-AF65-F5344CB8AC3E}">
+        <p14:creationId xmlns:p14="http://schemas.microsoft.com/office/powerpoint/2010/main" val="144807405"/>
+      </p:ext>
+    </p:extLst>
+  </p:cSld>
+  <p:clrMapOvr>
+    <a:masterClrMapping/>
+  </p:clrMapOvr>
+</p:sld>
+</file>
+
+<file path=ppt/slides/slide4.xml><?xml version="1.0" encoding="utf-8"?>
+<p:sld xmlns:a="http://schemas.openxmlformats.org/drawingml/2006/main" xmlns:r="http://schemas.openxmlformats.org/officeDocument/2006/relationships" xmlns:p="http://schemas.openxmlformats.org/presentationml/2006/main">
+  <p:cSld>
+    <p:spTree>
+      <p:nvGrpSpPr>
+        <p:cNvPr id="1" name=""/>
+        <p:cNvGrpSpPr/>
+        <p:nvPr/>
+      </p:nvGrpSpPr>
+      <p:grpSpPr>
+        <a:xfrm>
+          <a:off x="0" y="0"/>
+          <a:ext cx="0" cy="0"/>
+          <a:chOff x="0" y="0"/>
+          <a:chExt cx="0" cy="0"/>
+        </a:xfrm>
+      </p:grpSpPr>
+      <p:sp>
+        <p:nvSpPr>
+          <p:cNvPr id="4" name="TextBox 3"/>
+          <p:cNvSpPr txBox="1"/>
+          <p:nvPr/>
+        </p:nvSpPr>
+        <p:spPr>
+          <a:xfrm>
+            <a:off x="0" y="0"/>
+            <a:ext cx="1945725" cy="369332"/>
+          </a:xfrm>
+          <a:prstGeom prst="rect">
+            <a:avLst/>
+          </a:prstGeom>
+          <a:noFill/>
+        </p:spPr>
+        <p:txBody>
+          <a:bodyPr wrap="none" rtlCol="0">
+            <a:spAutoFit/>
+          </a:bodyPr>
+          <a:lstStyle/>
+          <a:p>
+            <a:r>
+              <a:rPr lang="en-SG" dirty="0">
+                <a:latin typeface="Garamond" panose="02020404030301010803" pitchFamily="18" charset="0"/>
+              </a:rPr>
+              <a:t>Controller Diagram</a:t>
+            </a:r>
+          </a:p>
+        </p:txBody>
+      </p:sp>
+      <p:grpSp>
+        <p:nvGrpSpPr>
+          <p:cNvPr id="82" name="Group 81"/>
+          <p:cNvGrpSpPr/>
+          <p:nvPr/>
+        </p:nvGrpSpPr>
+        <p:grpSpPr>
+          <a:xfrm>
+            <a:off x="221003" y="605481"/>
+            <a:ext cx="11846594" cy="6153665"/>
+            <a:chOff x="221003" y="605481"/>
+            <a:chExt cx="11846594" cy="6153665"/>
+          </a:xfrm>
+        </p:grpSpPr>
+        <p:sp>
+          <p:nvSpPr>
+            <p:cNvPr id="25" name="Rectangle: Rounded Corners 24"/>
+            <p:cNvSpPr/>
+            <p:nvPr/>
+          </p:nvSpPr>
+          <p:spPr>
+            <a:xfrm>
+              <a:off x="2154219" y="605481"/>
+              <a:ext cx="7058723" cy="6153665"/>
+            </a:xfrm>
+            <a:prstGeom prst="roundRect">
+              <a:avLst/>
+            </a:prstGeom>
+            <a:ln/>
+          </p:spPr>
+          <p:style>
+            <a:lnRef idx="2">
+              <a:schemeClr val="accent1"/>
+            </a:lnRef>
+            <a:fillRef idx="1">
+              <a:schemeClr val="lt1"/>
+            </a:fillRef>
+            <a:effectRef idx="0">
+              <a:schemeClr val="accent1"/>
+            </a:effectRef>
+            <a:fontRef idx="minor">
+              <a:schemeClr val="dk1"/>
+            </a:fontRef>
+          </p:style>
+          <p:txBody>
+            <a:bodyPr rtlCol="0" anchor="ctr"/>
+            <a:lstStyle/>
+            <a:p>
+              <a:pPr algn="ctr"/>
+              <a:endParaRPr lang="en-SG" dirty="0">
+                <a:solidFill>
+                  <a:schemeClr val="accent2"/>
+                </a:solidFill>
+              </a:endParaRPr>
+            </a:p>
+          </p:txBody>
+        </p:sp>
+        <p:sp>
+          <p:nvSpPr>
+            <p:cNvPr id="7" name="Rectangle 6"/>
+            <p:cNvSpPr/>
+            <p:nvPr/>
+          </p:nvSpPr>
+          <p:spPr>
+            <a:xfrm>
+              <a:off x="2388791" y="1506610"/>
+              <a:ext cx="1592370" cy="533885"/>
+            </a:xfrm>
+            <a:prstGeom prst="rect">
+              <a:avLst/>
+            </a:prstGeom>
+            <a:gradFill>
+              <a:gsLst>
+                <a:gs pos="29000">
+                  <a:schemeClr val="accent1">
+                    <a:lumMod val="40000"/>
+                    <a:lumOff val="60000"/>
+                  </a:schemeClr>
+                </a:gs>
+                <a:gs pos="100000">
+                  <a:schemeClr val="accent1">
+                    <a:lumMod val="20000"/>
+                    <a:lumOff val="80000"/>
+                  </a:schemeClr>
+                </a:gs>
+              </a:gsLst>
+              <a:lin ang="5400000" scaled="1"/>
+            </a:gradFill>
+            <a:ln w="12700">
+              <a:solidFill>
+                <a:schemeClr val="accent1"/>
+              </a:solidFill>
+            </a:ln>
+          </p:spPr>
+          <p:style>
+            <a:lnRef idx="1">
+              <a:schemeClr val="accent6"/>
+            </a:lnRef>
+            <a:fillRef idx="2">
+              <a:schemeClr val="accent6"/>
+            </a:fillRef>
+            <a:effectRef idx="1">
+              <a:schemeClr val="accent6"/>
+            </a:effectRef>
+            <a:fontRef idx="minor">
+              <a:schemeClr val="dk1"/>
+            </a:fontRef>
+          </p:style>
+          <p:txBody>
+            <a:bodyPr rtlCol="0" anchor="ctr"/>
+            <a:lstStyle/>
+            <a:p>
+              <a:pPr algn="ctr"/>
+              <a:r>
+                <a:rPr lang="en-SG" sz="1400" dirty="0">
+                  <a:solidFill>
+                    <a:schemeClr val="accent1"/>
+                  </a:solidFill>
+                </a:rPr>
+                <a:t>ConsoleController</a:t>
+              </a:r>
+            </a:p>
+          </p:txBody>
+        </p:sp>
+        <p:sp>
+          <p:nvSpPr>
+            <p:cNvPr id="24" name="TextBox 23"/>
+            <p:cNvSpPr txBox="1"/>
+            <p:nvPr/>
+          </p:nvSpPr>
+          <p:spPr>
+            <a:xfrm>
+              <a:off x="2571988" y="862995"/>
+              <a:ext cx="1225976" cy="369332"/>
+            </a:xfrm>
+            <a:prstGeom prst="rect">
+              <a:avLst/>
+            </a:prstGeom>
+            <a:noFill/>
+          </p:spPr>
+          <p:txBody>
+            <a:bodyPr wrap="square" rtlCol="0">
+              <a:spAutoFit/>
+            </a:bodyPr>
+            <a:lstStyle/>
+            <a:p>
+              <a:r>
+                <a:rPr lang="en-SG" dirty="0">
+                  <a:solidFill>
+                    <a:schemeClr val="accent1"/>
+                  </a:solidFill>
+                </a:rPr>
+                <a:t>Controller</a:t>
+              </a:r>
+            </a:p>
+          </p:txBody>
+        </p:sp>
+        <p:sp>
+          <p:nvSpPr>
+            <p:cNvPr id="36" name="Rectangle: Rounded Corners 35"/>
+            <p:cNvSpPr/>
+            <p:nvPr/>
+          </p:nvSpPr>
+          <p:spPr>
+            <a:xfrm>
+              <a:off x="10615870" y="3216503"/>
+              <a:ext cx="1451727" cy="785293"/>
+            </a:xfrm>
+            <a:prstGeom prst="roundRect">
+              <a:avLst/>
+            </a:prstGeom>
+            <a:ln w="19050"/>
+          </p:spPr>
+          <p:style>
+            <a:lnRef idx="2">
+              <a:schemeClr val="accent6"/>
+            </a:lnRef>
+            <a:fillRef idx="1">
+              <a:schemeClr val="lt1"/>
+            </a:fillRef>
+            <a:effectRef idx="0">
+              <a:schemeClr val="accent6"/>
+            </a:effectRef>
+            <a:fontRef idx="minor">
+              <a:schemeClr val="dk1"/>
+            </a:fontRef>
+          </p:style>
+          <p:txBody>
+            <a:bodyPr rtlCol="0" anchor="ctr"/>
+            <a:lstStyle/>
+            <a:p>
+              <a:pPr algn="ctr"/>
+              <a:r>
+                <a:rPr lang="en-SG" dirty="0">
+                  <a:solidFill>
+                    <a:schemeClr val="accent6"/>
+                  </a:solidFill>
+                </a:rPr>
+                <a:t>Model</a:t>
+              </a:r>
+            </a:p>
+          </p:txBody>
+        </p:sp>
+        <p:grpSp>
+          <p:nvGrpSpPr>
+            <p:cNvPr id="53" name="Group 52"/>
+            <p:cNvGrpSpPr/>
+            <p:nvPr/>
+          </p:nvGrpSpPr>
+          <p:grpSpPr>
+            <a:xfrm>
+              <a:off x="221003" y="1424549"/>
+              <a:ext cx="508000" cy="808389"/>
+              <a:chOff x="2622102" y="2866883"/>
+              <a:chExt cx="508000" cy="808389"/>
+            </a:xfrm>
+          </p:grpSpPr>
+          <p:sp>
+            <p:nvSpPr>
+              <p:cNvPr id="54" name="Smiley Face 53"/>
+              <p:cNvSpPr/>
+              <p:nvPr/>
+            </p:nvSpPr>
+            <p:spPr>
+              <a:xfrm>
+                <a:off x="2622102" y="2866883"/>
+                <a:ext cx="508000" cy="480291"/>
+              </a:xfrm>
+              <a:prstGeom prst="smileyFace">
+                <a:avLst/>
+              </a:prstGeom>
+              <a:solidFill>
+                <a:schemeClr val="accent2">
+                  <a:lumMod val="20000"/>
+                  <a:lumOff val="80000"/>
+                </a:schemeClr>
+              </a:solidFill>
+              <a:ln>
+                <a:solidFill>
+                  <a:schemeClr val="bg2">
+                    <a:lumMod val="50000"/>
+                  </a:schemeClr>
+                </a:solidFill>
+              </a:ln>
+            </p:spPr>
+            <p:style>
+              <a:lnRef idx="1">
+                <a:schemeClr val="accent3"/>
+              </a:lnRef>
+              <a:fillRef idx="2">
+                <a:schemeClr val="accent3"/>
+              </a:fillRef>
+              <a:effectRef idx="1">
+                <a:schemeClr val="accent3"/>
+              </a:effectRef>
+              <a:fontRef idx="minor">
+                <a:schemeClr val="dk1"/>
+              </a:fontRef>
+            </p:style>
+            <p:txBody>
+              <a:bodyPr rtlCol="0" anchor="ctr"/>
+              <a:lstStyle/>
+              <a:p>
+                <a:pPr algn="ctr"/>
+                <a:endParaRPr lang="en-SG" dirty="0"/>
+              </a:p>
+            </p:txBody>
+          </p:sp>
+          <p:sp>
+            <p:nvSpPr>
+              <p:cNvPr id="55" name="TextBox 54"/>
+              <p:cNvSpPr txBox="1"/>
+              <p:nvPr/>
+            </p:nvSpPr>
+            <p:spPr>
+              <a:xfrm>
+                <a:off x="2629880" y="3305940"/>
+                <a:ext cx="492443" cy="369332"/>
+              </a:xfrm>
+              <a:prstGeom prst="rect">
+                <a:avLst/>
+              </a:prstGeom>
+              <a:noFill/>
+            </p:spPr>
+            <p:txBody>
+              <a:bodyPr wrap="none" rtlCol="0">
+                <a:spAutoFit/>
+              </a:bodyPr>
+              <a:lstStyle/>
+              <a:p>
+                <a:r>
+                  <a:rPr lang="en-SG" dirty="0">
+                    <a:solidFill>
+                      <a:schemeClr val="bg2">
+                        <a:lumMod val="50000"/>
+                      </a:schemeClr>
+                    </a:solidFill>
+                    <a:latin typeface="Garamond" panose="02020404030301010803" pitchFamily="18" charset="0"/>
+                  </a:rPr>
+                  <a:t>Jim</a:t>
+                </a:r>
+              </a:p>
+            </p:txBody>
+          </p:sp>
+        </p:grpSp>
+        <p:cxnSp>
+          <p:nvCxnSpPr>
+            <p:cNvPr id="56" name="Straight Arrow Connector 55"/>
+            <p:cNvCxnSpPr/>
+            <p:nvPr/>
+          </p:nvCxnSpPr>
+          <p:spPr>
+            <a:xfrm>
+              <a:off x="880642" y="1681391"/>
+              <a:ext cx="1134295" cy="9429"/>
+            </a:xfrm>
+            <a:prstGeom prst="straightConnector1">
+              <a:avLst/>
+            </a:prstGeom>
+            <a:ln w="38100">
+              <a:solidFill>
+                <a:schemeClr val="accent2">
+                  <a:lumMod val="60000"/>
+                  <a:lumOff val="40000"/>
+                </a:schemeClr>
+              </a:solidFill>
+              <a:headEnd type="none" w="med" len="med"/>
+              <a:tailEnd type="arrow" w="med" len="med"/>
+            </a:ln>
+          </p:spPr>
+          <p:style>
+            <a:lnRef idx="1">
+              <a:schemeClr val="accent1"/>
+            </a:lnRef>
+            <a:fillRef idx="0">
+              <a:schemeClr val="accent1"/>
+            </a:fillRef>
+            <a:effectRef idx="0">
+              <a:schemeClr val="accent1"/>
+            </a:effectRef>
+            <a:fontRef idx="minor">
+              <a:schemeClr val="tx1"/>
+            </a:fontRef>
+          </p:style>
+        </p:cxnSp>
+        <p:cxnSp>
+          <p:nvCxnSpPr>
+            <p:cNvPr id="58" name="Straight Arrow Connector 57"/>
+            <p:cNvCxnSpPr/>
+            <p:nvPr/>
+          </p:nvCxnSpPr>
+          <p:spPr>
+            <a:xfrm>
+              <a:off x="9312905" y="3499119"/>
+              <a:ext cx="1134295" cy="9429"/>
+            </a:xfrm>
+            <a:prstGeom prst="straightConnector1">
+              <a:avLst/>
+            </a:prstGeom>
+            <a:ln w="38100">
+              <a:solidFill>
+                <a:schemeClr val="accent2">
+                  <a:lumMod val="60000"/>
+                  <a:lumOff val="40000"/>
+                </a:schemeClr>
+              </a:solidFill>
+              <a:headEnd type="none" w="med" len="med"/>
+              <a:tailEnd type="arrow" w="med" len="med"/>
+            </a:ln>
+          </p:spPr>
+          <p:style>
+            <a:lnRef idx="1">
+              <a:schemeClr val="accent1"/>
+            </a:lnRef>
+            <a:fillRef idx="0">
+              <a:schemeClr val="accent1"/>
+            </a:fillRef>
+            <a:effectRef idx="0">
+              <a:schemeClr val="accent1"/>
+            </a:effectRef>
+            <a:fontRef idx="minor">
+              <a:schemeClr val="tx1"/>
+            </a:fontRef>
+          </p:style>
+        </p:cxnSp>
+        <p:sp>
+          <p:nvSpPr>
+            <p:cNvPr id="30" name="TextBox 29"/>
+            <p:cNvSpPr txBox="1"/>
+            <p:nvPr/>
+          </p:nvSpPr>
+          <p:spPr>
+            <a:xfrm>
+              <a:off x="863535" y="1735780"/>
+              <a:ext cx="999280" cy="369332"/>
+            </a:xfrm>
+            <a:prstGeom prst="rect">
+              <a:avLst/>
+            </a:prstGeom>
+            <a:noFill/>
+          </p:spPr>
+          <p:txBody>
+            <a:bodyPr wrap="square" rtlCol="0">
+              <a:spAutoFit/>
+            </a:bodyPr>
+            <a:lstStyle/>
+            <a:p>
+              <a:r>
+                <a:rPr lang="en-SG" i="1" dirty="0"/>
+                <a:t>Interacts</a:t>
+              </a:r>
+            </a:p>
+          </p:txBody>
+        </p:sp>
+        <p:sp>
+          <p:nvSpPr>
+            <p:cNvPr id="31" name="TextBox 30"/>
+            <p:cNvSpPr txBox="1"/>
+            <p:nvPr/>
+          </p:nvSpPr>
+          <p:spPr>
+            <a:xfrm>
+              <a:off x="9212942" y="3579634"/>
+              <a:ext cx="1360662" cy="369332"/>
+            </a:xfrm>
+            <a:prstGeom prst="rect">
+              <a:avLst/>
+            </a:prstGeom>
+            <a:noFill/>
+          </p:spPr>
+          <p:txBody>
+            <a:bodyPr wrap="square" rtlCol="0">
+              <a:spAutoFit/>
+            </a:bodyPr>
+            <a:lstStyle/>
+            <a:p>
+              <a:r>
+                <a:rPr lang="en-SG" i="1" dirty="0"/>
+                <a:t>Manipulates</a:t>
+              </a:r>
+            </a:p>
+          </p:txBody>
+        </p:sp>
+        <p:sp>
+          <p:nvSpPr>
+            <p:cNvPr id="34" name="Rectangle 33"/>
+            <p:cNvSpPr/>
+            <p:nvPr/>
+          </p:nvSpPr>
+          <p:spPr>
+            <a:xfrm>
+              <a:off x="2388791" y="2516541"/>
+              <a:ext cx="1592370" cy="533885"/>
+            </a:xfrm>
+            <a:prstGeom prst="rect">
+              <a:avLst/>
+            </a:prstGeom>
+            <a:gradFill>
+              <a:gsLst>
+                <a:gs pos="29000">
+                  <a:schemeClr val="accent1">
+                    <a:lumMod val="40000"/>
+                    <a:lumOff val="60000"/>
+                  </a:schemeClr>
+                </a:gs>
+                <a:gs pos="100000">
+                  <a:schemeClr val="accent1">
+                    <a:lumMod val="20000"/>
+                    <a:lumOff val="80000"/>
+                  </a:schemeClr>
+                </a:gs>
+              </a:gsLst>
+              <a:lin ang="5400000" scaled="1"/>
+            </a:gradFill>
+            <a:ln w="12700">
+              <a:solidFill>
+                <a:schemeClr val="accent1"/>
+              </a:solidFill>
+            </a:ln>
+          </p:spPr>
+          <p:style>
+            <a:lnRef idx="1">
+              <a:schemeClr val="accent6"/>
+            </a:lnRef>
+            <a:fillRef idx="2">
+              <a:schemeClr val="accent6"/>
+            </a:fillRef>
+            <a:effectRef idx="1">
+              <a:schemeClr val="accent6"/>
+            </a:effectRef>
+            <a:fontRef idx="minor">
+              <a:schemeClr val="dk1"/>
+            </a:fontRef>
+          </p:style>
+          <p:txBody>
+            <a:bodyPr rtlCol="0" anchor="ctr"/>
+            <a:lstStyle/>
+            <a:p>
+              <a:pPr algn="ctr"/>
+              <a:r>
+                <a:rPr lang="en-SG" sz="1400" dirty="0">
+                  <a:solidFill>
+                    <a:schemeClr val="accent1"/>
+                  </a:solidFill>
+                </a:rPr>
+                <a:t>ControlUnit</a:t>
+              </a:r>
+            </a:p>
+          </p:txBody>
+        </p:sp>
+        <p:sp>
+          <p:nvSpPr>
+            <p:cNvPr id="35" name="Rectangle 34"/>
+            <p:cNvSpPr/>
+            <p:nvPr/>
+          </p:nvSpPr>
+          <p:spPr>
+            <a:xfrm>
+              <a:off x="2409948" y="3526472"/>
+              <a:ext cx="1592370" cy="533885"/>
+            </a:xfrm>
+            <a:prstGeom prst="rect">
+              <a:avLst/>
+            </a:prstGeom>
+            <a:gradFill>
+              <a:gsLst>
+                <a:gs pos="29000">
+                  <a:schemeClr val="accent1">
+                    <a:lumMod val="40000"/>
+                    <a:lumOff val="60000"/>
+                  </a:schemeClr>
+                </a:gs>
+                <a:gs pos="100000">
+                  <a:schemeClr val="accent1">
+                    <a:lumMod val="20000"/>
+                    <a:lumOff val="80000"/>
+                  </a:schemeClr>
+                </a:gs>
+              </a:gsLst>
+              <a:lin ang="5400000" scaled="1"/>
+            </a:gradFill>
+            <a:ln w="12700">
+              <a:solidFill>
+                <a:schemeClr val="accent1"/>
+              </a:solidFill>
+            </a:ln>
+          </p:spPr>
+          <p:style>
+            <a:lnRef idx="1">
+              <a:schemeClr val="accent6"/>
+            </a:lnRef>
+            <a:fillRef idx="2">
+              <a:schemeClr val="accent6"/>
+            </a:fillRef>
+            <a:effectRef idx="1">
+              <a:schemeClr val="accent6"/>
+            </a:effectRef>
+            <a:fontRef idx="minor">
+              <a:schemeClr val="dk1"/>
+            </a:fontRef>
+          </p:style>
+          <p:txBody>
+            <a:bodyPr rtlCol="0" anchor="ctr"/>
+            <a:lstStyle/>
+            <a:p>
+              <a:pPr algn="ctr"/>
+              <a:r>
+                <a:rPr lang="en-SG" sz="1400" dirty="0">
+                  <a:solidFill>
+                    <a:schemeClr val="accent1"/>
+                  </a:solidFill>
+                </a:rPr>
+                <a:t>CommandManager</a:t>
+              </a:r>
+            </a:p>
+          </p:txBody>
+        </p:sp>
+        <p:sp>
+          <p:nvSpPr>
+            <p:cNvPr id="38" name="Rectangle 37"/>
+            <p:cNvSpPr/>
+            <p:nvPr/>
+          </p:nvSpPr>
+          <p:spPr>
+            <a:xfrm>
+              <a:off x="2388791" y="4536403"/>
+              <a:ext cx="1592370" cy="533885"/>
+            </a:xfrm>
+            <a:prstGeom prst="rect">
+              <a:avLst/>
+            </a:prstGeom>
+            <a:ln/>
+          </p:spPr>
+          <p:style>
+            <a:lnRef idx="2">
+              <a:schemeClr val="accent1"/>
+            </a:lnRef>
+            <a:fillRef idx="1">
+              <a:schemeClr val="lt1"/>
+            </a:fillRef>
+            <a:effectRef idx="0">
+              <a:schemeClr val="accent1"/>
+            </a:effectRef>
+            <a:fontRef idx="minor">
+              <a:schemeClr val="dk1"/>
+            </a:fontRef>
+          </p:style>
+          <p:txBody>
+            <a:bodyPr rtlCol="0" anchor="ctr"/>
+            <a:lstStyle/>
+            <a:p>
+              <a:pPr algn="ctr"/>
+              <a:r>
+                <a:rPr lang="en-SG" sz="1400" dirty="0">
+                  <a:solidFill>
+                    <a:schemeClr val="accent1"/>
+                  </a:solidFill>
+                </a:rPr>
+                <a:t>&lt;&lt; Interface&gt;&gt;</a:t>
+              </a:r>
+            </a:p>
+            <a:p>
+              <a:pPr algn="ctr"/>
+              <a:r>
+                <a:rPr lang="en-SG" sz="1400" dirty="0">
+                  <a:solidFill>
+                    <a:schemeClr val="accent1"/>
+                  </a:solidFill>
+                </a:rPr>
+                <a:t>Command</a:t>
+              </a:r>
+            </a:p>
+          </p:txBody>
+        </p:sp>
+        <p:sp>
+          <p:nvSpPr>
+            <p:cNvPr id="39" name="Rectangle 38"/>
+            <p:cNvSpPr/>
+            <p:nvPr/>
+          </p:nvSpPr>
+          <p:spPr>
+            <a:xfrm>
+              <a:off x="2409948" y="5558691"/>
+              <a:ext cx="1592370" cy="533885"/>
+            </a:xfrm>
+            <a:prstGeom prst="rect">
+              <a:avLst/>
+            </a:prstGeom>
+            <a:ln/>
+          </p:spPr>
+          <p:style>
+            <a:lnRef idx="2">
+              <a:schemeClr val="accent1"/>
+            </a:lnRef>
+            <a:fillRef idx="1">
+              <a:schemeClr val="lt1"/>
+            </a:fillRef>
+            <a:effectRef idx="0">
+              <a:schemeClr val="accent1"/>
+            </a:effectRef>
+            <a:fontRef idx="minor">
+              <a:schemeClr val="dk1"/>
+            </a:fontRef>
+          </p:style>
+          <p:txBody>
+            <a:bodyPr rtlCol="0" anchor="ctr"/>
+            <a:lstStyle/>
+            <a:p>
+              <a:pPr algn="ctr"/>
+              <a:r>
+                <a:rPr lang="en-SG" sz="1400" dirty="0">
+                  <a:solidFill>
+                    <a:schemeClr val="accent1"/>
+                  </a:solidFill>
+                </a:rPr>
+                <a:t>&lt;&lt; Interface&gt;&gt;</a:t>
+              </a:r>
+            </a:p>
+            <a:p>
+              <a:pPr algn="ctr"/>
+              <a:r>
+                <a:rPr lang="en-SG" sz="1400" dirty="0">
+                  <a:solidFill>
+                    <a:schemeClr val="accent1"/>
+                  </a:solidFill>
+                </a:rPr>
+                <a:t>CommandResult</a:t>
+              </a:r>
+            </a:p>
+          </p:txBody>
+        </p:sp>
+        <p:sp>
+          <p:nvSpPr>
+            <p:cNvPr id="50" name="Rectangle 49"/>
+            <p:cNvSpPr/>
+            <p:nvPr/>
+          </p:nvSpPr>
+          <p:spPr>
+            <a:xfrm>
+              <a:off x="7009376" y="3960966"/>
+              <a:ext cx="1782592" cy="533885"/>
+            </a:xfrm>
+            <a:prstGeom prst="rect">
+              <a:avLst/>
+            </a:prstGeom>
+            <a:gradFill>
+              <a:gsLst>
+                <a:gs pos="29000">
+                  <a:schemeClr val="accent1">
+                    <a:lumMod val="40000"/>
+                    <a:lumOff val="60000"/>
+                  </a:schemeClr>
+                </a:gs>
+                <a:gs pos="100000">
+                  <a:schemeClr val="accent1">
+                    <a:lumMod val="20000"/>
+                    <a:lumOff val="80000"/>
+                  </a:schemeClr>
+                </a:gs>
+              </a:gsLst>
+              <a:lin ang="5400000" scaled="1"/>
+            </a:gradFill>
+            <a:ln w="12700">
+              <a:solidFill>
+                <a:schemeClr val="accent1"/>
+              </a:solidFill>
+            </a:ln>
+          </p:spPr>
+          <p:style>
+            <a:lnRef idx="1">
+              <a:schemeClr val="accent6"/>
+            </a:lnRef>
+            <a:fillRef idx="2">
+              <a:schemeClr val="accent6"/>
+            </a:fillRef>
+            <a:effectRef idx="1">
+              <a:schemeClr val="accent6"/>
+            </a:effectRef>
+            <a:fontRef idx="minor">
+              <a:schemeClr val="dk1"/>
+            </a:fontRef>
+          </p:style>
+          <p:txBody>
+            <a:bodyPr rtlCol="0" anchor="ctr"/>
+            <a:lstStyle/>
+            <a:p>
+              <a:pPr algn="ctr"/>
+              <a:r>
+                <a:rPr lang="en-SG" sz="1400" dirty="0">
+                  <a:solidFill>
+                    <a:schemeClr val="accent1"/>
+                  </a:solidFill>
+                </a:rPr>
+                <a:t>TimeParserManager</a:t>
+              </a:r>
+            </a:p>
+          </p:txBody>
+        </p:sp>
+        <p:sp>
+          <p:nvSpPr>
+            <p:cNvPr id="60" name="Rectangle 59"/>
+            <p:cNvSpPr/>
+            <p:nvPr/>
+          </p:nvSpPr>
+          <p:spPr>
+            <a:xfrm>
+              <a:off x="7009377" y="2965234"/>
+              <a:ext cx="1782591" cy="533885"/>
+            </a:xfrm>
+            <a:prstGeom prst="rect">
+              <a:avLst/>
+            </a:prstGeom>
+            <a:ln/>
+          </p:spPr>
+          <p:style>
+            <a:lnRef idx="2">
+              <a:schemeClr val="accent1"/>
+            </a:lnRef>
+            <a:fillRef idx="1">
+              <a:schemeClr val="lt1"/>
+            </a:fillRef>
+            <a:effectRef idx="0">
+              <a:schemeClr val="accent1"/>
+            </a:effectRef>
+            <a:fontRef idx="minor">
+              <a:schemeClr val="dk1"/>
+            </a:fontRef>
+          </p:style>
+          <p:txBody>
+            <a:bodyPr rtlCol="0" anchor="ctr"/>
+            <a:lstStyle/>
+            <a:p>
+              <a:pPr algn="ctr"/>
+              <a:r>
+                <a:rPr lang="en-SG" sz="1400" dirty="0">
+                  <a:solidFill>
+                    <a:schemeClr val="accent1"/>
+                  </a:solidFill>
+                </a:rPr>
+                <a:t>&lt;&lt; Interface&gt;&gt;</a:t>
+              </a:r>
+            </a:p>
+            <a:p>
+              <a:pPr algn="ctr"/>
+              <a:r>
+                <a:rPr lang="en-SG" sz="1400" dirty="0">
+                  <a:solidFill>
+                    <a:schemeClr val="accent1"/>
+                  </a:solidFill>
+                </a:rPr>
+                <a:t>TimeParser</a:t>
+              </a:r>
+            </a:p>
+          </p:txBody>
+        </p:sp>
+        <p:sp>
+          <p:nvSpPr>
+            <p:cNvPr id="61" name="Rectangle 60"/>
+            <p:cNvSpPr/>
+            <p:nvPr/>
+          </p:nvSpPr>
+          <p:spPr>
+            <a:xfrm>
+              <a:off x="4819636" y="3960966"/>
+              <a:ext cx="1592370" cy="533885"/>
+            </a:xfrm>
+            <a:prstGeom prst="rect">
+              <a:avLst/>
+            </a:prstGeom>
+            <a:gradFill>
+              <a:gsLst>
+                <a:gs pos="29000">
+                  <a:schemeClr val="accent1">
+                    <a:lumMod val="40000"/>
+                    <a:lumOff val="60000"/>
+                  </a:schemeClr>
+                </a:gs>
+                <a:gs pos="100000">
+                  <a:schemeClr val="accent1">
+                    <a:lumMod val="20000"/>
+                    <a:lumOff val="80000"/>
+                  </a:schemeClr>
+                </a:gs>
+              </a:gsLst>
+              <a:lin ang="5400000" scaled="1"/>
+            </a:gradFill>
+            <a:ln w="12700">
+              <a:solidFill>
+                <a:schemeClr val="accent1"/>
+              </a:solidFill>
+            </a:ln>
+          </p:spPr>
+          <p:style>
+            <a:lnRef idx="1">
+              <a:schemeClr val="accent6"/>
+            </a:lnRef>
+            <a:fillRef idx="2">
+              <a:schemeClr val="accent6"/>
+            </a:fillRef>
+            <a:effectRef idx="1">
+              <a:schemeClr val="accent6"/>
+            </a:effectRef>
+            <a:fontRef idx="minor">
+              <a:schemeClr val="dk1"/>
+            </a:fontRef>
+          </p:style>
+          <p:txBody>
+            <a:bodyPr rtlCol="0" anchor="ctr"/>
+            <a:lstStyle/>
+            <a:p>
+              <a:pPr algn="ctr"/>
+              <a:r>
+                <a:rPr lang="en-SG" sz="1400" dirty="0">
+                  <a:solidFill>
+                    <a:schemeClr val="accent1"/>
+                  </a:solidFill>
+                </a:rPr>
+                <a:t>AddCommand</a:t>
+              </a:r>
+            </a:p>
+          </p:txBody>
+        </p:sp>
+        <p:sp>
+          <p:nvSpPr>
+            <p:cNvPr id="62" name="Rectangle 61"/>
+            <p:cNvSpPr/>
+            <p:nvPr/>
+          </p:nvSpPr>
+          <p:spPr>
+            <a:xfrm>
+              <a:off x="4815275" y="4770887"/>
+              <a:ext cx="1592370" cy="533885"/>
+            </a:xfrm>
+            <a:prstGeom prst="rect">
+              <a:avLst/>
+            </a:prstGeom>
+            <a:gradFill>
+              <a:gsLst>
+                <a:gs pos="29000">
+                  <a:schemeClr val="accent1">
+                    <a:lumMod val="40000"/>
+                    <a:lumOff val="60000"/>
+                  </a:schemeClr>
+                </a:gs>
+                <a:gs pos="100000">
+                  <a:schemeClr val="accent1">
+                    <a:lumMod val="20000"/>
+                    <a:lumOff val="80000"/>
+                  </a:schemeClr>
+                </a:gs>
+              </a:gsLst>
+              <a:lin ang="5400000" scaled="1"/>
+            </a:gradFill>
+            <a:ln w="12700">
+              <a:solidFill>
+                <a:schemeClr val="accent1"/>
+              </a:solidFill>
+            </a:ln>
+          </p:spPr>
+          <p:style>
+            <a:lnRef idx="1">
+              <a:schemeClr val="accent6"/>
+            </a:lnRef>
+            <a:fillRef idx="2">
+              <a:schemeClr val="accent6"/>
+            </a:fillRef>
+            <a:effectRef idx="1">
+              <a:schemeClr val="accent6"/>
+            </a:effectRef>
+            <a:fontRef idx="minor">
+              <a:schemeClr val="dk1"/>
+            </a:fontRef>
+          </p:style>
+          <p:txBody>
+            <a:bodyPr rtlCol="0" anchor="ctr"/>
+            <a:lstStyle/>
+            <a:p>
+              <a:pPr algn="ctr"/>
+              <a:r>
+                <a:rPr lang="en-SG" sz="1400" dirty="0">
+                  <a:solidFill>
+                    <a:schemeClr val="accent1"/>
+                  </a:solidFill>
+                </a:rPr>
+                <a:t>ListCommand</a:t>
+              </a:r>
+            </a:p>
+          </p:txBody>
+        </p:sp>
+        <p:sp>
+          <p:nvSpPr>
+            <p:cNvPr id="63" name="Rectangle 62"/>
+            <p:cNvSpPr/>
+            <p:nvPr/>
+          </p:nvSpPr>
+          <p:spPr>
+            <a:xfrm>
+              <a:off x="4815275" y="5504448"/>
+              <a:ext cx="1592370" cy="533885"/>
+            </a:xfrm>
+            <a:prstGeom prst="rect">
+              <a:avLst/>
+            </a:prstGeom>
+            <a:gradFill>
+              <a:gsLst>
+                <a:gs pos="29000">
+                  <a:schemeClr val="accent1">
+                    <a:lumMod val="40000"/>
+                    <a:lumOff val="60000"/>
+                  </a:schemeClr>
+                </a:gs>
+                <a:gs pos="100000">
+                  <a:schemeClr val="accent1">
+                    <a:lumMod val="20000"/>
+                    <a:lumOff val="80000"/>
+                  </a:schemeClr>
+                </a:gs>
+              </a:gsLst>
+              <a:lin ang="5400000" scaled="1"/>
+            </a:gradFill>
+            <a:ln w="12700">
+              <a:solidFill>
+                <a:schemeClr val="accent1"/>
+              </a:solidFill>
+            </a:ln>
+          </p:spPr>
+          <p:style>
+            <a:lnRef idx="1">
+              <a:schemeClr val="accent6"/>
+            </a:lnRef>
+            <a:fillRef idx="2">
+              <a:schemeClr val="accent6"/>
+            </a:fillRef>
+            <a:effectRef idx="1">
+              <a:schemeClr val="accent6"/>
+            </a:effectRef>
+            <a:fontRef idx="minor">
+              <a:schemeClr val="dk1"/>
+            </a:fontRef>
+          </p:style>
+          <p:txBody>
+            <a:bodyPr rtlCol="0" anchor="ctr"/>
+            <a:lstStyle/>
+            <a:p>
+              <a:pPr algn="ctr"/>
+              <a:r>
+                <a:rPr lang="en-SG" sz="1400" dirty="0">
+                  <a:solidFill>
+                    <a:schemeClr val="accent1"/>
+                  </a:solidFill>
+                </a:rPr>
+                <a:t>…Command</a:t>
+              </a:r>
+            </a:p>
+          </p:txBody>
+        </p:sp>
+        <p:sp>
+          <p:nvSpPr>
+            <p:cNvPr id="64" name="Rectangle 63"/>
+            <p:cNvSpPr/>
+            <p:nvPr/>
+          </p:nvSpPr>
+          <p:spPr>
+            <a:xfrm>
+              <a:off x="5208225" y="1751427"/>
+              <a:ext cx="2045986" cy="533885"/>
+            </a:xfrm>
+            <a:prstGeom prst="rect">
+              <a:avLst/>
+            </a:prstGeom>
+            <a:gradFill>
+              <a:gsLst>
+                <a:gs pos="29000">
+                  <a:schemeClr val="accent1">
+                    <a:lumMod val="40000"/>
+                    <a:lumOff val="60000"/>
+                  </a:schemeClr>
+                </a:gs>
+                <a:gs pos="100000">
+                  <a:schemeClr val="accent1">
+                    <a:lumMod val="20000"/>
+                    <a:lumOff val="80000"/>
+                  </a:schemeClr>
+                </a:gs>
+              </a:gsLst>
+              <a:lin ang="5400000" scaled="1"/>
+            </a:gradFill>
+            <a:ln w="12700">
+              <a:solidFill>
+                <a:schemeClr val="accent1"/>
+              </a:solidFill>
+            </a:ln>
+          </p:spPr>
+          <p:style>
+            <a:lnRef idx="1">
+              <a:schemeClr val="accent6"/>
+            </a:lnRef>
+            <a:fillRef idx="2">
+              <a:schemeClr val="accent6"/>
+            </a:fillRef>
+            <a:effectRef idx="1">
+              <a:schemeClr val="accent6"/>
+            </a:effectRef>
+            <a:fontRef idx="minor">
+              <a:schemeClr val="dk1"/>
+            </a:fontRef>
+          </p:style>
+          <p:txBody>
+            <a:bodyPr rtlCol="0" anchor="ctr"/>
+            <a:lstStyle/>
+            <a:p>
+              <a:pPr algn="ctr"/>
+              <a:r>
+                <a:rPr lang="en-SG" sz="1400" dirty="0">
+                  <a:solidFill>
+                    <a:schemeClr val="accent1"/>
+                  </a:solidFill>
+                </a:rPr>
+                <a:t>ISODateWithTimeParser</a:t>
+              </a:r>
+            </a:p>
+          </p:txBody>
+        </p:sp>
+        <p:sp>
+          <p:nvSpPr>
+            <p:cNvPr id="65" name="Rectangle 64"/>
+            <p:cNvSpPr/>
+            <p:nvPr/>
+          </p:nvSpPr>
+          <p:spPr>
+            <a:xfrm>
+              <a:off x="7440746" y="1781329"/>
+              <a:ext cx="1579686" cy="533885"/>
+            </a:xfrm>
+            <a:prstGeom prst="rect">
+              <a:avLst/>
+            </a:prstGeom>
+            <a:gradFill>
+              <a:gsLst>
+                <a:gs pos="29000">
+                  <a:schemeClr val="accent1">
+                    <a:lumMod val="40000"/>
+                    <a:lumOff val="60000"/>
+                  </a:schemeClr>
+                </a:gs>
+                <a:gs pos="100000">
+                  <a:schemeClr val="accent1">
+                    <a:lumMod val="20000"/>
+                    <a:lumOff val="80000"/>
+                  </a:schemeClr>
+                </a:gs>
+              </a:gsLst>
+              <a:lin ang="5400000" scaled="1"/>
+            </a:gradFill>
+            <a:ln w="12700">
+              <a:solidFill>
+                <a:schemeClr val="accent1"/>
+              </a:solidFill>
+            </a:ln>
+          </p:spPr>
+          <p:style>
+            <a:lnRef idx="1">
+              <a:schemeClr val="accent6"/>
+            </a:lnRef>
+            <a:fillRef idx="2">
+              <a:schemeClr val="accent6"/>
+            </a:fillRef>
+            <a:effectRef idx="1">
+              <a:schemeClr val="accent6"/>
+            </a:effectRef>
+            <a:fontRef idx="minor">
+              <a:schemeClr val="dk1"/>
+            </a:fontRef>
+          </p:style>
+          <p:txBody>
+            <a:bodyPr rtlCol="0" anchor="ctr"/>
+            <a:lstStyle/>
+            <a:p>
+              <a:pPr algn="ctr"/>
+              <a:r>
+                <a:rPr lang="en-SG" sz="1400" dirty="0">
+                  <a:solidFill>
+                    <a:schemeClr val="accent1"/>
+                  </a:solidFill>
+                </a:rPr>
+                <a:t>…TimeParser</a:t>
+              </a:r>
+            </a:p>
+          </p:txBody>
+        </p:sp>
+        <p:cxnSp>
+          <p:nvCxnSpPr>
+            <p:cNvPr id="3" name="Connector: Elbow 2"/>
+            <p:cNvCxnSpPr/>
+            <p:nvPr/>
+          </p:nvCxnSpPr>
+          <p:spPr>
+            <a:xfrm rot="10800000" flipV="1">
+              <a:off x="3981161" y="4287794"/>
+              <a:ext cx="834114" cy="515551"/>
+            </a:xfrm>
+            <a:prstGeom prst="bentConnector3">
+              <a:avLst/>
+            </a:prstGeom>
+            <a:ln>
+              <a:prstDash val="dash"/>
+              <a:tailEnd type="triangle"/>
+            </a:ln>
+          </p:spPr>
+          <p:style>
+            <a:lnRef idx="1">
+              <a:schemeClr val="accent1"/>
+            </a:lnRef>
+            <a:fillRef idx="0">
+              <a:schemeClr val="accent1"/>
+            </a:fillRef>
+            <a:effectRef idx="0">
+              <a:schemeClr val="accent1"/>
+            </a:effectRef>
+            <a:fontRef idx="minor">
+              <a:schemeClr val="tx1"/>
+            </a:fontRef>
+          </p:style>
+        </p:cxnSp>
+        <p:cxnSp>
+          <p:nvCxnSpPr>
+            <p:cNvPr id="16" name="Connector: Elbow 15"/>
+            <p:cNvCxnSpPr>
+              <a:stCxn id="62" idx="1"/>
+            </p:cNvCxnSpPr>
+            <p:nvPr/>
+          </p:nvCxnSpPr>
+          <p:spPr>
+            <a:xfrm rot="10800000">
+              <a:off x="4398217" y="4770888"/>
+              <a:ext cx="417058" cy="266943"/>
+            </a:xfrm>
+            <a:prstGeom prst="bentConnector3">
+              <a:avLst>
+                <a:gd name="adj1" fmla="val 100368"/>
+              </a:avLst>
+            </a:prstGeom>
+            <a:ln>
+              <a:prstDash val="dash"/>
+            </a:ln>
+          </p:spPr>
+          <p:style>
+            <a:lnRef idx="1">
+              <a:schemeClr val="accent1"/>
+            </a:lnRef>
+            <a:fillRef idx="0">
+              <a:schemeClr val="accent1"/>
+            </a:fillRef>
+            <a:effectRef idx="0">
+              <a:schemeClr val="accent1"/>
+            </a:effectRef>
+            <a:fontRef idx="minor">
+              <a:schemeClr val="tx1"/>
+            </a:fontRef>
+          </p:style>
+        </p:cxnSp>
+        <p:cxnSp>
+          <p:nvCxnSpPr>
+            <p:cNvPr id="19" name="Connector: Elbow 18"/>
+            <p:cNvCxnSpPr>
+              <a:stCxn id="63" idx="1"/>
+            </p:cNvCxnSpPr>
+            <p:nvPr/>
+          </p:nvCxnSpPr>
+          <p:spPr>
+            <a:xfrm rot="10800000">
+              <a:off x="4398217" y="5037829"/>
+              <a:ext cx="417059" cy="733562"/>
+            </a:xfrm>
+            <a:prstGeom prst="bentConnector2">
+              <a:avLst/>
+            </a:prstGeom>
+            <a:ln>
+              <a:prstDash val="dash"/>
+            </a:ln>
+          </p:spPr>
+          <p:style>
+            <a:lnRef idx="1">
+              <a:schemeClr val="accent1"/>
+            </a:lnRef>
+            <a:fillRef idx="0">
+              <a:schemeClr val="accent1"/>
+            </a:fillRef>
+            <a:effectRef idx="0">
+              <a:schemeClr val="accent1"/>
+            </a:effectRef>
+            <a:fontRef idx="minor">
+              <a:schemeClr val="tx1"/>
+            </a:fontRef>
+          </p:style>
+        </p:cxnSp>
+        <p:cxnSp>
+          <p:nvCxnSpPr>
+            <p:cNvPr id="21" name="Connector: Elbow 20"/>
+            <p:cNvCxnSpPr>
+              <a:stCxn id="64" idx="2"/>
+              <a:endCxn id="60" idx="0"/>
+            </p:cNvCxnSpPr>
+            <p:nvPr/>
+          </p:nvCxnSpPr>
+          <p:spPr>
+            <a:xfrm rot="16200000" flipH="1">
+              <a:off x="6725984" y="1790545"/>
+              <a:ext cx="679922" cy="1669455"/>
+            </a:xfrm>
+            <a:prstGeom prst="bentConnector3">
+              <a:avLst/>
+            </a:prstGeom>
+            <a:ln>
+              <a:prstDash val="dash"/>
+              <a:tailEnd type="triangle"/>
+            </a:ln>
+          </p:spPr>
+          <p:style>
+            <a:lnRef idx="1">
+              <a:schemeClr val="accent1"/>
+            </a:lnRef>
+            <a:fillRef idx="0">
+              <a:schemeClr val="accent1"/>
+            </a:fillRef>
+            <a:effectRef idx="0">
+              <a:schemeClr val="accent1"/>
+            </a:effectRef>
+            <a:fontRef idx="minor">
+              <a:schemeClr val="tx1"/>
+            </a:fontRef>
+          </p:style>
+        </p:cxnSp>
+        <p:cxnSp>
+          <p:nvCxnSpPr>
+            <p:cNvPr id="23" name="Connector: Elbow 22"/>
+            <p:cNvCxnSpPr>
+              <a:stCxn id="65" idx="2"/>
+            </p:cNvCxnSpPr>
+            <p:nvPr/>
+          </p:nvCxnSpPr>
+          <p:spPr>
+            <a:xfrm rot="5400000">
+              <a:off x="7910601" y="2305286"/>
+              <a:ext cx="310060" cy="329917"/>
+            </a:xfrm>
+            <a:prstGeom prst="bentConnector2">
+              <a:avLst/>
+            </a:prstGeom>
+            <a:ln>
+              <a:prstDash val="dash"/>
+            </a:ln>
+          </p:spPr>
+          <p:style>
+            <a:lnRef idx="1">
+              <a:schemeClr val="accent1"/>
+            </a:lnRef>
+            <a:fillRef idx="0">
+              <a:schemeClr val="accent1"/>
+            </a:fillRef>
+            <a:effectRef idx="0">
+              <a:schemeClr val="accent1"/>
+            </a:effectRef>
+            <a:fontRef idx="minor">
+              <a:schemeClr val="tx1"/>
+            </a:fontRef>
+          </p:style>
+        </p:cxnSp>
+        <p:sp>
+          <p:nvSpPr>
+            <p:cNvPr id="67" name="Diamond 66"/>
+            <p:cNvSpPr/>
+            <p:nvPr/>
+          </p:nvSpPr>
+          <p:spPr>
+            <a:xfrm>
+              <a:off x="3086248" y="2055618"/>
+              <a:ext cx="197456" cy="231649"/>
+            </a:xfrm>
+            <a:prstGeom prst="diamond">
+              <a:avLst/>
+            </a:prstGeom>
+          </p:spPr>
+          <p:style>
+            <a:lnRef idx="2">
+              <a:schemeClr val="accent1">
+                <a:shade val="50000"/>
+              </a:schemeClr>
+            </a:lnRef>
+            <a:fillRef idx="1">
+              <a:schemeClr val="accent1"/>
+            </a:fillRef>
+            <a:effectRef idx="0">
+              <a:schemeClr val="accent1"/>
+            </a:effectRef>
+            <a:fontRef idx="minor">
+              <a:schemeClr val="lt1"/>
+            </a:fontRef>
+          </p:style>
+          <p:txBody>
+            <a:bodyPr rtlCol="0" anchor="ctr"/>
+            <a:lstStyle/>
+            <a:p>
+              <a:pPr algn="ctr"/>
+              <a:endParaRPr lang="en-SG" dirty="0"/>
+            </a:p>
+          </p:txBody>
+        </p:sp>
+        <p:sp>
+          <p:nvSpPr>
+            <p:cNvPr id="68" name="Diamond 67"/>
+            <p:cNvSpPr/>
+            <p:nvPr/>
+          </p:nvSpPr>
+          <p:spPr>
+            <a:xfrm>
+              <a:off x="3086248" y="3067386"/>
+              <a:ext cx="197456" cy="231649"/>
+            </a:xfrm>
+            <a:prstGeom prst="diamond">
+              <a:avLst/>
+            </a:prstGeom>
+          </p:spPr>
+          <p:style>
+            <a:lnRef idx="2">
+              <a:schemeClr val="accent1">
+                <a:shade val="50000"/>
+              </a:schemeClr>
+            </a:lnRef>
+            <a:fillRef idx="1">
+              <a:schemeClr val="accent1"/>
+            </a:fillRef>
+            <a:effectRef idx="0">
+              <a:schemeClr val="accent1"/>
+            </a:effectRef>
+            <a:fontRef idx="minor">
+              <a:schemeClr val="lt1"/>
+            </a:fontRef>
+          </p:style>
+          <p:txBody>
+            <a:bodyPr rtlCol="0" anchor="ctr"/>
+            <a:lstStyle/>
+            <a:p>
+              <a:pPr algn="ctr"/>
+              <a:endParaRPr lang="en-SG"/>
+            </a:p>
+          </p:txBody>
+        </p:sp>
+        <p:sp>
+          <p:nvSpPr>
+            <p:cNvPr id="69" name="Diamond 68"/>
+            <p:cNvSpPr/>
+            <p:nvPr/>
+          </p:nvSpPr>
+          <p:spPr>
+            <a:xfrm>
+              <a:off x="3086248" y="4037493"/>
+              <a:ext cx="197456" cy="231649"/>
+            </a:xfrm>
+            <a:prstGeom prst="diamond">
+              <a:avLst/>
+            </a:prstGeom>
+          </p:spPr>
+          <p:style>
+            <a:lnRef idx="2">
+              <a:schemeClr val="accent1">
+                <a:shade val="50000"/>
+              </a:schemeClr>
+            </a:lnRef>
+            <a:fillRef idx="1">
+              <a:schemeClr val="accent1"/>
+            </a:fillRef>
+            <a:effectRef idx="0">
+              <a:schemeClr val="accent1"/>
+            </a:effectRef>
+            <a:fontRef idx="minor">
+              <a:schemeClr val="lt1"/>
+            </a:fontRef>
+          </p:style>
+          <p:txBody>
+            <a:bodyPr rtlCol="0" anchor="ctr"/>
+            <a:lstStyle/>
+            <a:p>
+              <a:pPr algn="ctr"/>
+              <a:endParaRPr lang="en-SG"/>
+            </a:p>
+          </p:txBody>
+        </p:sp>
+        <p:sp>
+          <p:nvSpPr>
+            <p:cNvPr id="70" name="Diamond 69"/>
+            <p:cNvSpPr/>
+            <p:nvPr/>
+          </p:nvSpPr>
+          <p:spPr>
+            <a:xfrm>
+              <a:off x="3107405" y="5092433"/>
+              <a:ext cx="197456" cy="231649"/>
+            </a:xfrm>
+            <a:prstGeom prst="diamond">
+              <a:avLst/>
+            </a:prstGeom>
+          </p:spPr>
+          <p:style>
+            <a:lnRef idx="2">
+              <a:schemeClr val="accent1">
+                <a:shade val="50000"/>
+              </a:schemeClr>
+            </a:lnRef>
+            <a:fillRef idx="1">
+              <a:schemeClr val="accent1"/>
+            </a:fillRef>
+            <a:effectRef idx="0">
+              <a:schemeClr val="accent1"/>
+            </a:effectRef>
+            <a:fontRef idx="minor">
+              <a:schemeClr val="lt1"/>
+            </a:fontRef>
+          </p:style>
+          <p:txBody>
+            <a:bodyPr rtlCol="0" anchor="ctr"/>
+            <a:lstStyle/>
+            <a:p>
+              <a:pPr algn="ctr"/>
+              <a:endParaRPr lang="en-SG"/>
+            </a:p>
+          </p:txBody>
+        </p:sp>
+        <p:cxnSp>
+          <p:nvCxnSpPr>
+            <p:cNvPr id="71" name="Straight Arrow Connector 70"/>
+            <p:cNvCxnSpPr>
+              <a:stCxn id="67" idx="2"/>
+              <a:endCxn id="34" idx="0"/>
+            </p:cNvCxnSpPr>
+            <p:nvPr/>
+          </p:nvCxnSpPr>
+          <p:spPr>
+            <a:xfrm>
+              <a:off x="3184976" y="2287267"/>
+              <a:ext cx="0" cy="229274"/>
+            </a:xfrm>
+            <a:prstGeom prst="straightConnector1">
+              <a:avLst/>
+            </a:prstGeom>
+            <a:ln>
+              <a:solidFill>
+                <a:schemeClr val="accent1"/>
+              </a:solidFill>
+              <a:tailEnd type="triangle"/>
+            </a:ln>
+          </p:spPr>
+          <p:style>
+            <a:lnRef idx="1">
+              <a:schemeClr val="accent1"/>
+            </a:lnRef>
+            <a:fillRef idx="0">
+              <a:schemeClr val="accent1"/>
+            </a:fillRef>
+            <a:effectRef idx="0">
+              <a:schemeClr val="accent1"/>
+            </a:effectRef>
+            <a:fontRef idx="minor">
+              <a:schemeClr val="tx1"/>
+            </a:fontRef>
+          </p:style>
+        </p:cxnSp>
+        <p:cxnSp>
+          <p:nvCxnSpPr>
+            <p:cNvPr id="72" name="Straight Arrow Connector 71"/>
+            <p:cNvCxnSpPr/>
+            <p:nvPr/>
+          </p:nvCxnSpPr>
+          <p:spPr>
+            <a:xfrm>
+              <a:off x="3189094" y="3304643"/>
+              <a:ext cx="0" cy="229274"/>
+            </a:xfrm>
+            <a:prstGeom prst="straightConnector1">
+              <a:avLst/>
+            </a:prstGeom>
+            <a:ln>
+              <a:solidFill>
+                <a:schemeClr val="accent1"/>
+              </a:solidFill>
+              <a:tailEnd type="triangle"/>
+            </a:ln>
+          </p:spPr>
+          <p:style>
+            <a:lnRef idx="1">
+              <a:schemeClr val="accent1"/>
+            </a:lnRef>
+            <a:fillRef idx="0">
+              <a:schemeClr val="accent1"/>
+            </a:fillRef>
+            <a:effectRef idx="0">
+              <a:schemeClr val="accent1"/>
+            </a:effectRef>
+            <a:fontRef idx="minor">
+              <a:schemeClr val="tx1"/>
+            </a:fontRef>
+          </p:style>
+        </p:cxnSp>
+        <p:cxnSp>
+          <p:nvCxnSpPr>
+            <p:cNvPr id="73" name="Straight Arrow Connector 72"/>
+            <p:cNvCxnSpPr/>
+            <p:nvPr/>
+          </p:nvCxnSpPr>
+          <p:spPr>
+            <a:xfrm>
+              <a:off x="3201451" y="4293186"/>
+              <a:ext cx="0" cy="229274"/>
+            </a:xfrm>
+            <a:prstGeom prst="straightConnector1">
+              <a:avLst/>
+            </a:prstGeom>
+            <a:ln>
+              <a:solidFill>
+                <a:schemeClr val="accent1"/>
+              </a:solidFill>
+              <a:tailEnd type="triangle"/>
+            </a:ln>
+          </p:spPr>
+          <p:style>
+            <a:lnRef idx="1">
+              <a:schemeClr val="accent1"/>
+            </a:lnRef>
+            <a:fillRef idx="0">
+              <a:schemeClr val="accent1"/>
+            </a:fillRef>
+            <a:effectRef idx="0">
+              <a:schemeClr val="accent1"/>
+            </a:effectRef>
+            <a:fontRef idx="minor">
+              <a:schemeClr val="tx1"/>
+            </a:fontRef>
+          </p:style>
+        </p:cxnSp>
+        <p:cxnSp>
+          <p:nvCxnSpPr>
+            <p:cNvPr id="74" name="Straight Arrow Connector 73"/>
+            <p:cNvCxnSpPr/>
+            <p:nvPr/>
+          </p:nvCxnSpPr>
+          <p:spPr>
+            <a:xfrm>
+              <a:off x="3201452" y="5331157"/>
+              <a:ext cx="0" cy="229274"/>
+            </a:xfrm>
+            <a:prstGeom prst="straightConnector1">
+              <a:avLst/>
+            </a:prstGeom>
+            <a:ln>
+              <a:solidFill>
+                <a:schemeClr val="accent1"/>
+              </a:solidFill>
+              <a:tailEnd type="triangle"/>
+            </a:ln>
+          </p:spPr>
+          <p:style>
+            <a:lnRef idx="1">
+              <a:schemeClr val="accent1"/>
+            </a:lnRef>
+            <a:fillRef idx="0">
+              <a:schemeClr val="accent1"/>
+            </a:fillRef>
+            <a:effectRef idx="0">
+              <a:schemeClr val="accent1"/>
+            </a:effectRef>
+            <a:fontRef idx="minor">
+              <a:schemeClr val="tx1"/>
+            </a:fontRef>
+          </p:style>
+        </p:cxnSp>
+        <p:sp>
+          <p:nvSpPr>
+            <p:cNvPr id="75" name="Diamond 74"/>
+            <p:cNvSpPr/>
+            <p:nvPr/>
+          </p:nvSpPr>
+          <p:spPr>
+            <a:xfrm rot="16200000">
+              <a:off x="6452603" y="4112083"/>
+              <a:ext cx="197456" cy="231649"/>
+            </a:xfrm>
+            <a:prstGeom prst="diamond">
+              <a:avLst/>
+            </a:prstGeom>
+          </p:spPr>
+          <p:style>
+            <a:lnRef idx="2">
+              <a:schemeClr val="accent1">
+                <a:shade val="50000"/>
+              </a:schemeClr>
+            </a:lnRef>
+            <a:fillRef idx="1">
+              <a:schemeClr val="accent1"/>
+            </a:fillRef>
+            <a:effectRef idx="0">
+              <a:schemeClr val="accent1"/>
+            </a:effectRef>
+            <a:fontRef idx="minor">
+              <a:schemeClr val="lt1"/>
+            </a:fontRef>
+          </p:style>
+          <p:txBody>
+            <a:bodyPr rtlCol="0" anchor="ctr"/>
+            <a:lstStyle/>
+            <a:p>
+              <a:pPr algn="ctr"/>
+              <a:endParaRPr lang="en-SG"/>
+            </a:p>
+          </p:txBody>
+        </p:sp>
+        <p:cxnSp>
+          <p:nvCxnSpPr>
+            <p:cNvPr id="77" name="Straight Arrow Connector 76"/>
+            <p:cNvCxnSpPr>
+              <a:stCxn id="75" idx="0"/>
+            </p:cNvCxnSpPr>
+            <p:nvPr/>
+          </p:nvCxnSpPr>
+          <p:spPr>
+            <a:xfrm flipV="1">
+              <a:off x="6435507" y="4227907"/>
+              <a:ext cx="573869" cy="1"/>
+            </a:xfrm>
+            <a:prstGeom prst="straightConnector1">
+              <a:avLst/>
+            </a:prstGeom>
+            <a:ln>
+              <a:tailEnd type="triangle"/>
+            </a:ln>
+          </p:spPr>
+          <p:style>
+            <a:lnRef idx="1">
+              <a:schemeClr val="accent1"/>
+            </a:lnRef>
+            <a:fillRef idx="0">
+              <a:schemeClr val="accent1"/>
+            </a:fillRef>
+            <a:effectRef idx="0">
+              <a:schemeClr val="accent1"/>
+            </a:effectRef>
+            <a:fontRef idx="minor">
+              <a:schemeClr val="tx1"/>
+            </a:fontRef>
+          </p:style>
+        </p:cxnSp>
+        <p:sp>
+          <p:nvSpPr>
+            <p:cNvPr id="80" name="Diamond 79"/>
+            <p:cNvSpPr/>
+            <p:nvPr/>
+          </p:nvSpPr>
+          <p:spPr>
+            <a:xfrm>
+              <a:off x="7801944" y="3729317"/>
+              <a:ext cx="197456" cy="231649"/>
+            </a:xfrm>
+            <a:prstGeom prst="diamond">
+              <a:avLst/>
+            </a:prstGeom>
+          </p:spPr>
+          <p:style>
+            <a:lnRef idx="2">
+              <a:schemeClr val="accent1">
+                <a:shade val="50000"/>
+              </a:schemeClr>
+            </a:lnRef>
+            <a:fillRef idx="1">
+              <a:schemeClr val="accent1"/>
+            </a:fillRef>
+            <a:effectRef idx="0">
+              <a:schemeClr val="accent1"/>
+            </a:effectRef>
+            <a:fontRef idx="minor">
+              <a:schemeClr val="lt1"/>
+            </a:fontRef>
+          </p:style>
+          <p:txBody>
+            <a:bodyPr rtlCol="0" anchor="ctr"/>
+            <a:lstStyle/>
+            <a:p>
+              <a:pPr algn="ctr"/>
+              <a:endParaRPr lang="en-SG" dirty="0"/>
+            </a:p>
+          </p:txBody>
+        </p:sp>
+        <p:cxnSp>
+          <p:nvCxnSpPr>
+            <p:cNvPr id="81" name="Straight Arrow Connector 80"/>
+            <p:cNvCxnSpPr/>
+            <p:nvPr/>
+          </p:nvCxnSpPr>
+          <p:spPr>
+            <a:xfrm>
+              <a:off x="7884672" y="3502353"/>
+              <a:ext cx="0" cy="229274"/>
+            </a:xfrm>
+            <a:prstGeom prst="straightConnector1">
+              <a:avLst/>
+            </a:prstGeom>
+            <a:ln>
+              <a:solidFill>
+                <a:schemeClr val="accent1"/>
+              </a:solidFill>
+              <a:headEnd type="triangle" w="med" len="med"/>
+              <a:tailEnd type="none" w="med" len="med"/>
+            </a:ln>
+          </p:spPr>
+          <p:style>
+            <a:lnRef idx="1">
+              <a:schemeClr val="accent1"/>
+            </a:lnRef>
+            <a:fillRef idx="0">
+              <a:schemeClr val="accent1"/>
+            </a:fillRef>
+            <a:effectRef idx="0">
+              <a:schemeClr val="accent1"/>
+            </a:effectRef>
+            <a:fontRef idx="minor">
+              <a:schemeClr val="tx1"/>
+            </a:fontRef>
+          </p:style>
+        </p:cxnSp>
+      </p:grpSp>
+    </p:spTree>
+    <p:extLst>
+      <p:ext uri="{BB962C8B-B14F-4D97-AF65-F5344CB8AC3E}">
+        <p14:creationId xmlns:p14="http://schemas.microsoft.com/office/powerpoint/2010/main" val="1577130838"/>
+      </p:ext>
+    </p:extLst>
+  </p:cSld>
+  <p:clrMapOvr>
+    <a:masterClrMapping/>
+  </p:clrMapOvr>
+</p:sld>
+</file>
+
+<file path=ppt/slides/slide5.xml><?xml version="1.0" encoding="utf-8"?>
 <p:sld xmlns:a="http://schemas.openxmlformats.org/drawingml/2006/main" xmlns:r="http://schemas.openxmlformats.org/officeDocument/2006/relationships" xmlns:p="http://schemas.openxmlformats.org/presentationml/2006/main">
   <p:cSld>
     <p:spTree>
@@ -3932,7 +8670,7 @@
     </p:spTree>
     <p:extLst>
       <p:ext uri="{BB962C8B-B14F-4D97-AF65-F5344CB8AC3E}">
-        <p14:creationId xmlns:p14="http://schemas.microsoft.com/office/powerpoint/2010/main" val="2395715797"/>
+        <p14:creationId xmlns:p14="http://schemas.microsoft.com/office/powerpoint/2010/main" val="1289237162"/>
       </p:ext>
     </p:extLst>
   </p:cSld>
@@ -3942,7 +8680,7 @@
 </p:sld>
 </file>
 
-<file path=ppt/slides/slide2.xml><?xml version="1.0" encoding="utf-8"?>
+<file path=ppt/slides/slide6.xml><?xml version="1.0" encoding="utf-8"?>
 <p:sld xmlns:a="http://schemas.openxmlformats.org/drawingml/2006/main" xmlns:r="http://schemas.openxmlformats.org/officeDocument/2006/relationships" xmlns:p="http://schemas.openxmlformats.org/presentationml/2006/main">
   <p:cSld>
     <p:spTree>

</xml_diff>